<commit_message>
Maj diapo revue 2 + Journal d'activité
</commit_message>
<xml_diff>
--- a/Guillaume/Documents/Revue 2 de projet étudiant 1 Escape Game Téléthon.pptx
+++ b/Guillaume/Documents/Revue 2 de projet étudiant 1 Escape Game Téléthon.pptx
@@ -10,11 +10,13 @@
     <p:sldId id="263" r:id="rId4"/>
     <p:sldId id="261" r:id="rId5"/>
     <p:sldId id="262" r:id="rId6"/>
-    <p:sldId id="260" r:id="rId7"/>
-    <p:sldId id="267" r:id="rId8"/>
-    <p:sldId id="265" r:id="rId9"/>
-    <p:sldId id="268" r:id="rId10"/>
-    <p:sldId id="266" r:id="rId11"/>
+    <p:sldId id="267" r:id="rId7"/>
+    <p:sldId id="270" r:id="rId8"/>
+    <p:sldId id="269" r:id="rId9"/>
+    <p:sldId id="260" r:id="rId10"/>
+    <p:sldId id="265" r:id="rId11"/>
+    <p:sldId id="268" r:id="rId12"/>
+    <p:sldId id="266" r:id="rId13"/>
   </p:sldIdLst>
   <p:sldSz cx="12192000" cy="6858000"/>
   <p:notesSz cx="6858000" cy="9144000"/>
@@ -8123,6 +8125,1566 @@
         </p:nvSpPr>
         <p:spPr>
           <a:xfrm>
+            <a:off x="-301752" y="2554862"/>
+            <a:ext cx="3758184" cy="646331"/>
+          </a:xfrm>
+          <a:prstGeom prst="rect">
+            <a:avLst/>
+          </a:prstGeom>
+          <a:noFill/>
+        </p:spPr>
+        <p:txBody>
+          <a:bodyPr wrap="square" rtlCol="0">
+            <a:spAutoFit/>
+          </a:bodyPr>
+          <a:lstStyle/>
+          <a:p>
+            <a:pPr algn="ctr"/>
+            <a:r>
+              <a:rPr lang="fr-FR" sz="2000" b="1" dirty="0">
+                <a:effectLst>
+                  <a:outerShdw blurRad="38100" dist="38100" dir="2700000" algn="tl">
+                    <a:srgbClr val="000000">
+                      <a:alpha val="43137"/>
+                    </a:srgbClr>
+                  </a:outerShdw>
+                </a:effectLst>
+                <a:latin typeface="Eras Medium ITC" panose="020B0602030504020804" pitchFamily="34" charset="0"/>
+              </a:rPr>
+              <a:t>Diagramme de séquence :</a:t>
+            </a:r>
+          </a:p>
+          <a:p>
+            <a:pPr algn="ctr"/>
+            <a:r>
+              <a:rPr lang="fr-FR" sz="1600" b="1" dirty="0">
+                <a:solidFill>
+                  <a:srgbClr val="A51258"/>
+                </a:solidFill>
+                <a:effectLst>
+                  <a:outerShdw blurRad="38100" dist="38100" dir="2700000" algn="tl">
+                    <a:srgbClr val="000000">
+                      <a:alpha val="43137"/>
+                    </a:srgbClr>
+                  </a:outerShdw>
+                </a:effectLst>
+                <a:latin typeface="Eras Medium ITC" panose="020B0602030504020804" pitchFamily="34" charset="0"/>
+              </a:rPr>
+              <a:t>Système sous </a:t>
+            </a:r>
+            <a:r>
+              <a:rPr lang="fr-FR" sz="1600" b="1" dirty="0" err="1">
+                <a:solidFill>
+                  <a:srgbClr val="A51258"/>
+                </a:solidFill>
+                <a:effectLst>
+                  <a:outerShdw blurRad="38100" dist="38100" dir="2700000" algn="tl">
+                    <a:srgbClr val="000000">
+                      <a:alpha val="43137"/>
+                    </a:srgbClr>
+                  </a:outerShdw>
+                </a:effectLst>
+                <a:latin typeface="Eras Medium ITC" panose="020B0602030504020804" pitchFamily="34" charset="0"/>
+              </a:rPr>
+              <a:t>raspberry</a:t>
+            </a:r>
+            <a:r>
+              <a:rPr lang="fr-FR" sz="1600" b="1" dirty="0">
+                <a:solidFill>
+                  <a:srgbClr val="A51258"/>
+                </a:solidFill>
+                <a:effectLst>
+                  <a:outerShdw blurRad="38100" dist="38100" dir="2700000" algn="tl">
+                    <a:srgbClr val="000000">
+                      <a:alpha val="43137"/>
+                    </a:srgbClr>
+                  </a:outerShdw>
+                </a:effectLst>
+                <a:latin typeface="Eras Medium ITC" panose="020B0602030504020804" pitchFamily="34" charset="0"/>
+              </a:rPr>
+              <a:t>, partie 1 </a:t>
+            </a:r>
+          </a:p>
+        </p:txBody>
+      </p:sp>
+      <p:sp>
+        <p:nvSpPr>
+          <p:cNvPr id="6" name="Organigramme : Terminateur 5">
+            <a:extLst>
+              <a:ext uri="{FF2B5EF4-FFF2-40B4-BE49-F238E27FC236}">
+                <a16:creationId xmlns:a16="http://schemas.microsoft.com/office/drawing/2014/main" id="{D0388349-375C-432D-95E5-4335229F72C4}"/>
+              </a:ext>
+            </a:extLst>
+          </p:cNvPr>
+          <p:cNvSpPr/>
+          <p:nvPr/>
+        </p:nvSpPr>
+        <p:spPr>
+          <a:xfrm>
+            <a:off x="11405115" y="1514475"/>
+            <a:ext cx="358260" cy="85725"/>
+          </a:xfrm>
+          <a:prstGeom prst="flowChartTerminator">
+            <a:avLst/>
+          </a:prstGeom>
+          <a:solidFill>
+            <a:srgbClr val="A8135A"/>
+          </a:solidFill>
+          <a:ln>
+            <a:solidFill>
+              <a:schemeClr val="bg1"/>
+            </a:solidFill>
+          </a:ln>
+        </p:spPr>
+        <p:style>
+          <a:lnRef idx="2">
+            <a:schemeClr val="accent1">
+              <a:shade val="50000"/>
+            </a:schemeClr>
+          </a:lnRef>
+          <a:fillRef idx="1">
+            <a:schemeClr val="accent1"/>
+          </a:fillRef>
+          <a:effectRef idx="0">
+            <a:schemeClr val="accent1"/>
+          </a:effectRef>
+          <a:fontRef idx="minor">
+            <a:schemeClr val="lt1"/>
+          </a:fontRef>
+        </p:style>
+        <p:txBody>
+          <a:bodyPr rtlCol="0" anchor="ctr"/>
+          <a:lstStyle/>
+          <a:p>
+            <a:pPr algn="ctr"/>
+            <a:endParaRPr lang="fr-FR"/>
+          </a:p>
+        </p:txBody>
+      </p:sp>
+      <p:sp>
+        <p:nvSpPr>
+          <p:cNvPr id="7" name="Rectangle 6">
+            <a:extLst>
+              <a:ext uri="{FF2B5EF4-FFF2-40B4-BE49-F238E27FC236}">
+                <a16:creationId xmlns:a16="http://schemas.microsoft.com/office/drawing/2014/main" id="{7965C92B-62A3-4F91-80E9-84A7357D8ED7}"/>
+              </a:ext>
+            </a:extLst>
+          </p:cNvPr>
+          <p:cNvSpPr/>
+          <p:nvPr/>
+        </p:nvSpPr>
+        <p:spPr>
+          <a:xfrm>
+            <a:off x="11658600" y="753035"/>
+            <a:ext cx="104775" cy="5614778"/>
+          </a:xfrm>
+          <a:prstGeom prst="rect">
+            <a:avLst/>
+          </a:prstGeom>
+          <a:solidFill>
+            <a:schemeClr val="bg1"/>
+          </a:solidFill>
+          <a:ln>
+            <a:solidFill>
+              <a:schemeClr val="bg1"/>
+            </a:solidFill>
+          </a:ln>
+        </p:spPr>
+        <p:style>
+          <a:lnRef idx="2">
+            <a:schemeClr val="accent1">
+              <a:shade val="50000"/>
+            </a:schemeClr>
+          </a:lnRef>
+          <a:fillRef idx="1">
+            <a:schemeClr val="accent1"/>
+          </a:fillRef>
+          <a:effectRef idx="0">
+            <a:schemeClr val="accent1"/>
+          </a:effectRef>
+          <a:fontRef idx="minor">
+            <a:schemeClr val="lt1"/>
+          </a:fontRef>
+        </p:style>
+        <p:txBody>
+          <a:bodyPr rtlCol="0" anchor="ctr"/>
+          <a:lstStyle/>
+          <a:p>
+            <a:pPr algn="ctr"/>
+            <a:endParaRPr lang="fr-FR"/>
+          </a:p>
+        </p:txBody>
+      </p:sp>
+      <p:sp>
+        <p:nvSpPr>
+          <p:cNvPr id="9" name="Ellipse 8">
+            <a:extLst>
+              <a:ext uri="{FF2B5EF4-FFF2-40B4-BE49-F238E27FC236}">
+                <a16:creationId xmlns:a16="http://schemas.microsoft.com/office/drawing/2014/main" id="{76D06B21-1630-4698-BFB5-5F24222D7239}"/>
+              </a:ext>
+            </a:extLst>
+          </p:cNvPr>
+          <p:cNvSpPr/>
+          <p:nvPr/>
+        </p:nvSpPr>
+        <p:spPr>
+          <a:xfrm>
+            <a:off x="11428928" y="5851700"/>
+            <a:ext cx="564118" cy="542925"/>
+          </a:xfrm>
+          <a:prstGeom prst="ellipse">
+            <a:avLst/>
+          </a:prstGeom>
+          <a:solidFill>
+            <a:schemeClr val="bg1"/>
+          </a:solidFill>
+          <a:ln>
+            <a:solidFill>
+              <a:schemeClr val="bg1"/>
+            </a:solidFill>
+          </a:ln>
+        </p:spPr>
+        <p:style>
+          <a:lnRef idx="2">
+            <a:schemeClr val="accent1">
+              <a:shade val="50000"/>
+            </a:schemeClr>
+          </a:lnRef>
+          <a:fillRef idx="1">
+            <a:schemeClr val="accent1"/>
+          </a:fillRef>
+          <a:effectRef idx="0">
+            <a:schemeClr val="accent1"/>
+          </a:effectRef>
+          <a:fontRef idx="minor">
+            <a:schemeClr val="lt1"/>
+          </a:fontRef>
+        </p:style>
+        <p:txBody>
+          <a:bodyPr rtlCol="0" anchor="ctr"/>
+          <a:lstStyle/>
+          <a:p>
+            <a:pPr algn="ctr"/>
+            <a:endParaRPr lang="fr-FR"/>
+          </a:p>
+        </p:txBody>
+      </p:sp>
+      <p:sp>
+        <p:nvSpPr>
+          <p:cNvPr id="10" name="Organigramme : Terminateur 9">
+            <a:extLst>
+              <a:ext uri="{FF2B5EF4-FFF2-40B4-BE49-F238E27FC236}">
+                <a16:creationId xmlns:a16="http://schemas.microsoft.com/office/drawing/2014/main" id="{CB8C87E6-B87B-4E15-81CC-6DBA23DB12CA}"/>
+              </a:ext>
+            </a:extLst>
+          </p:cNvPr>
+          <p:cNvSpPr/>
+          <p:nvPr/>
+        </p:nvSpPr>
+        <p:spPr>
+          <a:xfrm>
+            <a:off x="11405114" y="2347824"/>
+            <a:ext cx="358259" cy="85725"/>
+          </a:xfrm>
+          <a:prstGeom prst="flowChartTerminator">
+            <a:avLst/>
+          </a:prstGeom>
+          <a:solidFill>
+            <a:srgbClr val="A8135A"/>
+          </a:solidFill>
+          <a:ln>
+            <a:solidFill>
+              <a:schemeClr val="bg1"/>
+            </a:solidFill>
+          </a:ln>
+        </p:spPr>
+        <p:style>
+          <a:lnRef idx="2">
+            <a:schemeClr val="accent1">
+              <a:shade val="50000"/>
+            </a:schemeClr>
+          </a:lnRef>
+          <a:fillRef idx="1">
+            <a:schemeClr val="accent1"/>
+          </a:fillRef>
+          <a:effectRef idx="0">
+            <a:schemeClr val="accent1"/>
+          </a:effectRef>
+          <a:fontRef idx="minor">
+            <a:schemeClr val="lt1"/>
+          </a:fontRef>
+        </p:style>
+        <p:txBody>
+          <a:bodyPr rtlCol="0" anchor="ctr"/>
+          <a:lstStyle/>
+          <a:p>
+            <a:pPr algn="ctr"/>
+            <a:endParaRPr lang="fr-FR"/>
+          </a:p>
+        </p:txBody>
+      </p:sp>
+      <p:sp>
+        <p:nvSpPr>
+          <p:cNvPr id="11" name="ZoneTexte 10">
+            <a:extLst>
+              <a:ext uri="{FF2B5EF4-FFF2-40B4-BE49-F238E27FC236}">
+                <a16:creationId xmlns:a16="http://schemas.microsoft.com/office/drawing/2014/main" id="{470680A5-31CA-4A5F-A91F-7E3BEF289E7E}"/>
+              </a:ext>
+            </a:extLst>
+          </p:cNvPr>
+          <p:cNvSpPr txBox="1"/>
+          <p:nvPr/>
+        </p:nvSpPr>
+        <p:spPr>
+          <a:xfrm>
+            <a:off x="10299143" y="558449"/>
+            <a:ext cx="1129785" cy="461665"/>
+          </a:xfrm>
+          <a:prstGeom prst="rect">
+            <a:avLst/>
+          </a:prstGeom>
+          <a:noFill/>
+        </p:spPr>
+        <p:txBody>
+          <a:bodyPr wrap="square" rtlCol="0">
+            <a:spAutoFit/>
+          </a:bodyPr>
+          <a:lstStyle/>
+          <a:p>
+            <a:pPr algn="r"/>
+            <a:r>
+              <a:rPr lang="fr-FR" sz="1200" dirty="0">
+                <a:latin typeface="Eras Medium ITC" panose="020B0602030504020804" pitchFamily="34" charset="0"/>
+              </a:rPr>
+              <a:t>Présentation du projet</a:t>
+            </a:r>
+          </a:p>
+        </p:txBody>
+      </p:sp>
+      <p:sp>
+        <p:nvSpPr>
+          <p:cNvPr id="12" name="ZoneTexte 11">
+            <a:extLst>
+              <a:ext uri="{FF2B5EF4-FFF2-40B4-BE49-F238E27FC236}">
+                <a16:creationId xmlns:a16="http://schemas.microsoft.com/office/drawing/2014/main" id="{118F324A-9355-4439-8D28-46B0B893CC58}"/>
+              </a:ext>
+            </a:extLst>
+          </p:cNvPr>
+          <p:cNvSpPr txBox="1"/>
+          <p:nvPr/>
+        </p:nvSpPr>
+        <p:spPr>
+          <a:xfrm>
+            <a:off x="10275329" y="1418837"/>
+            <a:ext cx="1129785" cy="276999"/>
+          </a:xfrm>
+          <a:prstGeom prst="rect">
+            <a:avLst/>
+          </a:prstGeom>
+          <a:noFill/>
+        </p:spPr>
+        <p:txBody>
+          <a:bodyPr wrap="square" rtlCol="0">
+            <a:spAutoFit/>
+          </a:bodyPr>
+          <a:lstStyle/>
+          <a:p>
+            <a:pPr algn="r"/>
+            <a:r>
+              <a:rPr lang="fr-FR" sz="1200" dirty="0">
+                <a:latin typeface="Eras Medium ITC" panose="020B0602030504020804" pitchFamily="34" charset="0"/>
+              </a:rPr>
+              <a:t>Générale</a:t>
+            </a:r>
+          </a:p>
+        </p:txBody>
+      </p:sp>
+      <p:sp>
+        <p:nvSpPr>
+          <p:cNvPr id="13" name="ZoneTexte 12">
+            <a:extLst>
+              <a:ext uri="{FF2B5EF4-FFF2-40B4-BE49-F238E27FC236}">
+                <a16:creationId xmlns:a16="http://schemas.microsoft.com/office/drawing/2014/main" id="{B0B65B09-BAE9-45E1-8DDD-BE198E82EA10}"/>
+              </a:ext>
+            </a:extLst>
+          </p:cNvPr>
+          <p:cNvSpPr txBox="1"/>
+          <p:nvPr/>
+        </p:nvSpPr>
+        <p:spPr>
+          <a:xfrm>
+            <a:off x="10310812" y="2252186"/>
+            <a:ext cx="1129785" cy="276999"/>
+          </a:xfrm>
+          <a:prstGeom prst="rect">
+            <a:avLst/>
+          </a:prstGeom>
+          <a:noFill/>
+        </p:spPr>
+        <p:txBody>
+          <a:bodyPr wrap="square" rtlCol="0">
+            <a:spAutoFit/>
+          </a:bodyPr>
+          <a:lstStyle/>
+          <a:p>
+            <a:pPr algn="r"/>
+            <a:r>
+              <a:rPr lang="fr-FR" sz="1200" dirty="0">
+                <a:latin typeface="Eras Medium ITC" panose="020B0602030504020804" pitchFamily="34" charset="0"/>
+              </a:rPr>
+              <a:t>Personnalisée</a:t>
+            </a:r>
+          </a:p>
+        </p:txBody>
+      </p:sp>
+      <p:sp>
+        <p:nvSpPr>
+          <p:cNvPr id="14" name="ZoneTexte 13">
+            <a:extLst>
+              <a:ext uri="{FF2B5EF4-FFF2-40B4-BE49-F238E27FC236}">
+                <a16:creationId xmlns:a16="http://schemas.microsoft.com/office/drawing/2014/main" id="{B5E860DF-2164-46BA-A256-EAAC919881DC}"/>
+              </a:ext>
+            </a:extLst>
+          </p:cNvPr>
+          <p:cNvSpPr txBox="1"/>
+          <p:nvPr/>
+        </p:nvSpPr>
+        <p:spPr>
+          <a:xfrm>
+            <a:off x="10113406" y="3241822"/>
+            <a:ext cx="1315522" cy="461665"/>
+          </a:xfrm>
+          <a:prstGeom prst="rect">
+            <a:avLst/>
+          </a:prstGeom>
+          <a:noFill/>
+        </p:spPr>
+        <p:txBody>
+          <a:bodyPr wrap="square" rtlCol="0">
+            <a:spAutoFit/>
+          </a:bodyPr>
+          <a:lstStyle/>
+          <a:p>
+            <a:pPr algn="r"/>
+            <a:r>
+              <a:rPr lang="fr-FR" sz="1200" dirty="0">
+                <a:latin typeface="Eras Medium ITC" panose="020B0602030504020804" pitchFamily="34" charset="0"/>
+              </a:rPr>
+              <a:t>Diagramme de cas d’utilisation</a:t>
+            </a:r>
+          </a:p>
+        </p:txBody>
+      </p:sp>
+      <p:sp>
+        <p:nvSpPr>
+          <p:cNvPr id="15" name="ZoneTexte 14">
+            <a:extLst>
+              <a:ext uri="{FF2B5EF4-FFF2-40B4-BE49-F238E27FC236}">
+                <a16:creationId xmlns:a16="http://schemas.microsoft.com/office/drawing/2014/main" id="{0E549171-6603-40D1-AACC-954D9ECD3358}"/>
+              </a:ext>
+            </a:extLst>
+          </p:cNvPr>
+          <p:cNvSpPr txBox="1"/>
+          <p:nvPr/>
+        </p:nvSpPr>
+        <p:spPr>
+          <a:xfrm>
+            <a:off x="10299143" y="5892329"/>
+            <a:ext cx="1129785" cy="461665"/>
+          </a:xfrm>
+          <a:prstGeom prst="rect">
+            <a:avLst/>
+          </a:prstGeom>
+          <a:noFill/>
+        </p:spPr>
+        <p:txBody>
+          <a:bodyPr wrap="square" rtlCol="0">
+            <a:spAutoFit/>
+          </a:bodyPr>
+          <a:lstStyle/>
+          <a:p>
+            <a:pPr algn="r"/>
+            <a:r>
+              <a:rPr lang="fr-FR" sz="1200" dirty="0">
+                <a:latin typeface="Eras Medium ITC" panose="020B0602030504020804" pitchFamily="34" charset="0"/>
+              </a:rPr>
+              <a:t>Les tâches personnelles</a:t>
+            </a:r>
+          </a:p>
+        </p:txBody>
+      </p:sp>
+      <p:sp>
+        <p:nvSpPr>
+          <p:cNvPr id="16" name="Rectangle 15">
+            <a:extLst>
+              <a:ext uri="{FF2B5EF4-FFF2-40B4-BE49-F238E27FC236}">
+                <a16:creationId xmlns:a16="http://schemas.microsoft.com/office/drawing/2014/main" id="{1D13FD37-1228-4A08-9F72-D32CBA322FEC}"/>
+              </a:ext>
+            </a:extLst>
+          </p:cNvPr>
+          <p:cNvSpPr/>
+          <p:nvPr/>
+        </p:nvSpPr>
+        <p:spPr>
+          <a:xfrm>
+            <a:off x="11658600" y="955383"/>
+            <a:ext cx="104773" cy="2245810"/>
+          </a:xfrm>
+          <a:prstGeom prst="rect">
+            <a:avLst/>
+          </a:prstGeom>
+          <a:solidFill>
+            <a:srgbClr val="A8135A"/>
+          </a:solidFill>
+          <a:ln>
+            <a:solidFill>
+              <a:schemeClr val="bg1"/>
+            </a:solidFill>
+          </a:ln>
+        </p:spPr>
+        <p:style>
+          <a:lnRef idx="2">
+            <a:schemeClr val="accent1">
+              <a:shade val="50000"/>
+            </a:schemeClr>
+          </a:lnRef>
+          <a:fillRef idx="1">
+            <a:schemeClr val="accent1"/>
+          </a:fillRef>
+          <a:effectRef idx="0">
+            <a:schemeClr val="accent1"/>
+          </a:effectRef>
+          <a:fontRef idx="minor">
+            <a:schemeClr val="lt1"/>
+          </a:fontRef>
+        </p:style>
+        <p:txBody>
+          <a:bodyPr rtlCol="0" anchor="ctr"/>
+          <a:lstStyle/>
+          <a:p>
+            <a:pPr algn="ctr"/>
+            <a:endParaRPr lang="fr-FR"/>
+          </a:p>
+        </p:txBody>
+      </p:sp>
+      <p:sp>
+        <p:nvSpPr>
+          <p:cNvPr id="17" name="Ellipse 16">
+            <a:extLst>
+              <a:ext uri="{FF2B5EF4-FFF2-40B4-BE49-F238E27FC236}">
+                <a16:creationId xmlns:a16="http://schemas.microsoft.com/office/drawing/2014/main" id="{9F704096-5C9D-41FD-B6A4-68CA21735651}"/>
+              </a:ext>
+            </a:extLst>
+          </p:cNvPr>
+          <p:cNvSpPr/>
+          <p:nvPr/>
+        </p:nvSpPr>
+        <p:spPr>
+          <a:xfrm>
+            <a:off x="11428928" y="550687"/>
+            <a:ext cx="564118" cy="542925"/>
+          </a:xfrm>
+          <a:prstGeom prst="ellipse">
+            <a:avLst/>
+          </a:prstGeom>
+          <a:solidFill>
+            <a:srgbClr val="A8135A"/>
+          </a:solidFill>
+          <a:ln>
+            <a:solidFill>
+              <a:schemeClr val="bg1"/>
+            </a:solidFill>
+          </a:ln>
+        </p:spPr>
+        <p:style>
+          <a:lnRef idx="2">
+            <a:schemeClr val="accent1">
+              <a:shade val="50000"/>
+            </a:schemeClr>
+          </a:lnRef>
+          <a:fillRef idx="1">
+            <a:schemeClr val="accent1"/>
+          </a:fillRef>
+          <a:effectRef idx="0">
+            <a:schemeClr val="accent1"/>
+          </a:effectRef>
+          <a:fontRef idx="minor">
+            <a:schemeClr val="lt1"/>
+          </a:fontRef>
+        </p:style>
+        <p:txBody>
+          <a:bodyPr rtlCol="0" anchor="ctr"/>
+          <a:lstStyle/>
+          <a:p>
+            <a:pPr algn="ctr"/>
+            <a:endParaRPr lang="fr-FR"/>
+          </a:p>
+        </p:txBody>
+      </p:sp>
+      <p:sp>
+        <p:nvSpPr>
+          <p:cNvPr id="8" name="Ellipse 7">
+            <a:extLst>
+              <a:ext uri="{FF2B5EF4-FFF2-40B4-BE49-F238E27FC236}">
+                <a16:creationId xmlns:a16="http://schemas.microsoft.com/office/drawing/2014/main" id="{527A32BE-E971-4F22-BE27-E8B13A47BF8B}"/>
+              </a:ext>
+            </a:extLst>
+          </p:cNvPr>
+          <p:cNvSpPr/>
+          <p:nvPr/>
+        </p:nvSpPr>
+        <p:spPr>
+          <a:xfrm>
+            <a:off x="11428928" y="3201193"/>
+            <a:ext cx="564118" cy="542925"/>
+          </a:xfrm>
+          <a:prstGeom prst="ellipse">
+            <a:avLst/>
+          </a:prstGeom>
+          <a:solidFill>
+            <a:srgbClr val="A8135A"/>
+          </a:solidFill>
+          <a:ln>
+            <a:solidFill>
+              <a:schemeClr val="bg1"/>
+            </a:solidFill>
+          </a:ln>
+        </p:spPr>
+        <p:style>
+          <a:lnRef idx="2">
+            <a:schemeClr val="accent1">
+              <a:shade val="50000"/>
+            </a:schemeClr>
+          </a:lnRef>
+          <a:fillRef idx="1">
+            <a:schemeClr val="accent1"/>
+          </a:fillRef>
+          <a:effectRef idx="0">
+            <a:schemeClr val="accent1"/>
+          </a:effectRef>
+          <a:fontRef idx="minor">
+            <a:schemeClr val="lt1"/>
+          </a:fontRef>
+        </p:style>
+        <p:txBody>
+          <a:bodyPr rtlCol="0" anchor="ctr"/>
+          <a:lstStyle/>
+          <a:p>
+            <a:pPr algn="ctr"/>
+            <a:endParaRPr lang="fr-FR"/>
+          </a:p>
+        </p:txBody>
+      </p:sp>
+      <p:pic>
+        <p:nvPicPr>
+          <p:cNvPr id="4" name="Image 3">
+            <a:extLst>
+              <a:ext uri="{FF2B5EF4-FFF2-40B4-BE49-F238E27FC236}">
+                <a16:creationId xmlns:a16="http://schemas.microsoft.com/office/drawing/2014/main" id="{F6F50CF8-8F97-49CE-8AC9-109901FFB29C}"/>
+              </a:ext>
+            </a:extLst>
+          </p:cNvPr>
+          <p:cNvPicPr>
+            <a:picLocks noChangeAspect="1"/>
+          </p:cNvPicPr>
+          <p:nvPr/>
+        </p:nvPicPr>
+        <p:blipFill rotWithShape="1">
+          <a:blip r:embed="rId3"/>
+          <a:srcRect r="35426" b="36133"/>
+          <a:stretch/>
+        </p:blipFill>
+        <p:spPr>
+          <a:xfrm>
+            <a:off x="3513019" y="0"/>
+            <a:ext cx="5223127" cy="6858000"/>
+          </a:xfrm>
+          <a:prstGeom prst="rect">
+            <a:avLst/>
+          </a:prstGeom>
+        </p:spPr>
+      </p:pic>
+    </p:spTree>
+    <p:extLst>
+      <p:ext uri="{BB962C8B-B14F-4D97-AF65-F5344CB8AC3E}">
+        <p14:creationId xmlns:p14="http://schemas.microsoft.com/office/powerpoint/2010/main" val="1939906211"/>
+      </p:ext>
+    </p:extLst>
+  </p:cSld>
+  <p:clrMapOvr>
+    <a:masterClrMapping/>
+  </p:clrMapOvr>
+  <mc:AlternateContent xmlns:mc="http://schemas.openxmlformats.org/markup-compatibility/2006" xmlns:p159="http://schemas.microsoft.com/office/powerpoint/2015/09/main">
+    <mc:Choice Requires="p159">
+      <p:transition xmlns:p14="http://schemas.microsoft.com/office/powerpoint/2010/main" spd="slow" p14:dur="2000">
+        <p159:morph option="byObject"/>
+      </p:transition>
+    </mc:Choice>
+    <mc:Fallback xmlns="">
+      <p:transition spd="slow">
+        <p:fade/>
+      </p:transition>
+    </mc:Fallback>
+  </mc:AlternateContent>
+</p:sld>
+</file>
+
+<file path=ppt/slides/slide11.xml><?xml version="1.0" encoding="utf-8"?>
+<p:sld xmlns:a="http://schemas.openxmlformats.org/drawingml/2006/main" xmlns:r="http://schemas.openxmlformats.org/officeDocument/2006/relationships" xmlns:p="http://schemas.openxmlformats.org/presentationml/2006/main">
+  <p:cSld>
+    <p:spTree>
+      <p:nvGrpSpPr>
+        <p:cNvPr id="1" name=""/>
+        <p:cNvGrpSpPr/>
+        <p:nvPr/>
+      </p:nvGrpSpPr>
+      <p:grpSpPr>
+        <a:xfrm>
+          <a:off x="0" y="0"/>
+          <a:ext cx="0" cy="0"/>
+          <a:chOff x="0" y="0"/>
+          <a:chExt cx="0" cy="0"/>
+        </a:xfrm>
+      </p:grpSpPr>
+      <p:pic>
+        <p:nvPicPr>
+          <p:cNvPr id="1026" name="Picture 2" descr="Image associée">
+            <a:extLst>
+              <a:ext uri="{FF2B5EF4-FFF2-40B4-BE49-F238E27FC236}">
+                <a16:creationId xmlns:a16="http://schemas.microsoft.com/office/drawing/2014/main" id="{C816F3D8-CC4C-46B3-A21E-58AE9AD30454}"/>
+              </a:ext>
+            </a:extLst>
+          </p:cNvPr>
+          <p:cNvPicPr>
+            <a:picLocks noChangeAspect="1" noChangeArrowheads="1"/>
+          </p:cNvPicPr>
+          <p:nvPr/>
+        </p:nvPicPr>
+        <p:blipFill rotWithShape="1">
+          <a:blip r:embed="rId2">
+            <a:extLst>
+              <a:ext uri="{28A0092B-C50C-407E-A947-70E740481C1C}">
+                <a14:useLocalDpi xmlns:a14="http://schemas.microsoft.com/office/drawing/2010/main" val="0"/>
+              </a:ext>
+            </a:extLst>
+          </a:blip>
+          <a:srcRect l="18677" r="15441"/>
+          <a:stretch/>
+        </p:blipFill>
+        <p:spPr bwMode="auto">
+          <a:xfrm>
+            <a:off x="143436" y="143435"/>
+            <a:ext cx="2269635" cy="609600"/>
+          </a:xfrm>
+          <a:prstGeom prst="rect">
+            <a:avLst/>
+          </a:prstGeom>
+          <a:noFill/>
+          <a:extLst>
+            <a:ext uri="{909E8E84-426E-40DD-AFC4-6F175D3DCCD1}">
+              <a14:hiddenFill xmlns:a14="http://schemas.microsoft.com/office/drawing/2010/main">
+                <a:solidFill>
+                  <a:srgbClr val="FFFFFF"/>
+                </a:solidFill>
+              </a14:hiddenFill>
+            </a:ext>
+          </a:extLst>
+        </p:spPr>
+      </p:pic>
+      <p:sp>
+        <p:nvSpPr>
+          <p:cNvPr id="2" name="ZoneTexte 1">
+            <a:extLst>
+              <a:ext uri="{FF2B5EF4-FFF2-40B4-BE49-F238E27FC236}">
+                <a16:creationId xmlns:a16="http://schemas.microsoft.com/office/drawing/2014/main" id="{144597CC-5B36-42C7-952E-C2CE1E34CACD}"/>
+              </a:ext>
+            </a:extLst>
+          </p:cNvPr>
+          <p:cNvSpPr txBox="1"/>
+          <p:nvPr/>
+        </p:nvSpPr>
+        <p:spPr>
+          <a:xfrm>
+            <a:off x="3704463" y="309052"/>
+            <a:ext cx="3758184" cy="646331"/>
+          </a:xfrm>
+          <a:prstGeom prst="rect">
+            <a:avLst/>
+          </a:prstGeom>
+          <a:noFill/>
+        </p:spPr>
+        <p:txBody>
+          <a:bodyPr wrap="square" rtlCol="0">
+            <a:spAutoFit/>
+          </a:bodyPr>
+          <a:lstStyle/>
+          <a:p>
+            <a:pPr algn="ctr"/>
+            <a:r>
+              <a:rPr lang="fr-FR" sz="2000" b="1" dirty="0">
+                <a:effectLst>
+                  <a:outerShdw blurRad="38100" dist="38100" dir="2700000" algn="tl">
+                    <a:srgbClr val="000000">
+                      <a:alpha val="43137"/>
+                    </a:srgbClr>
+                  </a:outerShdw>
+                </a:effectLst>
+                <a:latin typeface="Eras Medium ITC" panose="020B0602030504020804" pitchFamily="34" charset="0"/>
+              </a:rPr>
+              <a:t>Diagramme de séquence :</a:t>
+            </a:r>
+          </a:p>
+          <a:p>
+            <a:pPr algn="ctr"/>
+            <a:r>
+              <a:rPr lang="fr-FR" sz="1600" b="1" dirty="0">
+                <a:solidFill>
+                  <a:srgbClr val="A51258"/>
+                </a:solidFill>
+                <a:effectLst>
+                  <a:outerShdw blurRad="38100" dist="38100" dir="2700000" algn="tl">
+                    <a:srgbClr val="000000">
+                      <a:alpha val="43137"/>
+                    </a:srgbClr>
+                  </a:outerShdw>
+                </a:effectLst>
+                <a:latin typeface="Eras Medium ITC" panose="020B0602030504020804" pitchFamily="34" charset="0"/>
+              </a:rPr>
+              <a:t>Système sous </a:t>
+            </a:r>
+            <a:r>
+              <a:rPr lang="fr-FR" sz="1600" b="1" dirty="0" err="1">
+                <a:solidFill>
+                  <a:srgbClr val="A51258"/>
+                </a:solidFill>
+                <a:effectLst>
+                  <a:outerShdw blurRad="38100" dist="38100" dir="2700000" algn="tl">
+                    <a:srgbClr val="000000">
+                      <a:alpha val="43137"/>
+                    </a:srgbClr>
+                  </a:outerShdw>
+                </a:effectLst>
+                <a:latin typeface="Eras Medium ITC" panose="020B0602030504020804" pitchFamily="34" charset="0"/>
+              </a:rPr>
+              <a:t>raspberry</a:t>
+            </a:r>
+            <a:r>
+              <a:rPr lang="fr-FR" sz="1600" b="1" dirty="0">
+                <a:solidFill>
+                  <a:srgbClr val="A51258"/>
+                </a:solidFill>
+                <a:effectLst>
+                  <a:outerShdw blurRad="38100" dist="38100" dir="2700000" algn="tl">
+                    <a:srgbClr val="000000">
+                      <a:alpha val="43137"/>
+                    </a:srgbClr>
+                  </a:outerShdw>
+                </a:effectLst>
+                <a:latin typeface="Eras Medium ITC" panose="020B0602030504020804" pitchFamily="34" charset="0"/>
+              </a:rPr>
+              <a:t>, partie 2 </a:t>
+            </a:r>
+          </a:p>
+        </p:txBody>
+      </p:sp>
+      <p:sp>
+        <p:nvSpPr>
+          <p:cNvPr id="6" name="Organigramme : Terminateur 5">
+            <a:extLst>
+              <a:ext uri="{FF2B5EF4-FFF2-40B4-BE49-F238E27FC236}">
+                <a16:creationId xmlns:a16="http://schemas.microsoft.com/office/drawing/2014/main" id="{D0388349-375C-432D-95E5-4335229F72C4}"/>
+              </a:ext>
+            </a:extLst>
+          </p:cNvPr>
+          <p:cNvSpPr/>
+          <p:nvPr/>
+        </p:nvSpPr>
+        <p:spPr>
+          <a:xfrm>
+            <a:off x="11405115" y="1514475"/>
+            <a:ext cx="358260" cy="85725"/>
+          </a:xfrm>
+          <a:prstGeom prst="flowChartTerminator">
+            <a:avLst/>
+          </a:prstGeom>
+          <a:solidFill>
+            <a:srgbClr val="A8135A"/>
+          </a:solidFill>
+          <a:ln>
+            <a:solidFill>
+              <a:schemeClr val="bg1"/>
+            </a:solidFill>
+          </a:ln>
+        </p:spPr>
+        <p:style>
+          <a:lnRef idx="2">
+            <a:schemeClr val="accent1">
+              <a:shade val="50000"/>
+            </a:schemeClr>
+          </a:lnRef>
+          <a:fillRef idx="1">
+            <a:schemeClr val="accent1"/>
+          </a:fillRef>
+          <a:effectRef idx="0">
+            <a:schemeClr val="accent1"/>
+          </a:effectRef>
+          <a:fontRef idx="minor">
+            <a:schemeClr val="lt1"/>
+          </a:fontRef>
+        </p:style>
+        <p:txBody>
+          <a:bodyPr rtlCol="0" anchor="ctr"/>
+          <a:lstStyle/>
+          <a:p>
+            <a:pPr algn="ctr"/>
+            <a:endParaRPr lang="fr-FR"/>
+          </a:p>
+        </p:txBody>
+      </p:sp>
+      <p:sp>
+        <p:nvSpPr>
+          <p:cNvPr id="7" name="Rectangle 6">
+            <a:extLst>
+              <a:ext uri="{FF2B5EF4-FFF2-40B4-BE49-F238E27FC236}">
+                <a16:creationId xmlns:a16="http://schemas.microsoft.com/office/drawing/2014/main" id="{7965C92B-62A3-4F91-80E9-84A7357D8ED7}"/>
+              </a:ext>
+            </a:extLst>
+          </p:cNvPr>
+          <p:cNvSpPr/>
+          <p:nvPr/>
+        </p:nvSpPr>
+        <p:spPr>
+          <a:xfrm>
+            <a:off x="11658600" y="753035"/>
+            <a:ext cx="104775" cy="5614778"/>
+          </a:xfrm>
+          <a:prstGeom prst="rect">
+            <a:avLst/>
+          </a:prstGeom>
+          <a:solidFill>
+            <a:schemeClr val="bg1"/>
+          </a:solidFill>
+          <a:ln>
+            <a:solidFill>
+              <a:schemeClr val="bg1"/>
+            </a:solidFill>
+          </a:ln>
+        </p:spPr>
+        <p:style>
+          <a:lnRef idx="2">
+            <a:schemeClr val="accent1">
+              <a:shade val="50000"/>
+            </a:schemeClr>
+          </a:lnRef>
+          <a:fillRef idx="1">
+            <a:schemeClr val="accent1"/>
+          </a:fillRef>
+          <a:effectRef idx="0">
+            <a:schemeClr val="accent1"/>
+          </a:effectRef>
+          <a:fontRef idx="minor">
+            <a:schemeClr val="lt1"/>
+          </a:fontRef>
+        </p:style>
+        <p:txBody>
+          <a:bodyPr rtlCol="0" anchor="ctr"/>
+          <a:lstStyle/>
+          <a:p>
+            <a:pPr algn="ctr"/>
+            <a:endParaRPr lang="fr-FR"/>
+          </a:p>
+        </p:txBody>
+      </p:sp>
+      <p:sp>
+        <p:nvSpPr>
+          <p:cNvPr id="9" name="Ellipse 8">
+            <a:extLst>
+              <a:ext uri="{FF2B5EF4-FFF2-40B4-BE49-F238E27FC236}">
+                <a16:creationId xmlns:a16="http://schemas.microsoft.com/office/drawing/2014/main" id="{76D06B21-1630-4698-BFB5-5F24222D7239}"/>
+              </a:ext>
+            </a:extLst>
+          </p:cNvPr>
+          <p:cNvSpPr/>
+          <p:nvPr/>
+        </p:nvSpPr>
+        <p:spPr>
+          <a:xfrm>
+            <a:off x="11428928" y="5851700"/>
+            <a:ext cx="564118" cy="542925"/>
+          </a:xfrm>
+          <a:prstGeom prst="ellipse">
+            <a:avLst/>
+          </a:prstGeom>
+          <a:solidFill>
+            <a:schemeClr val="bg1"/>
+          </a:solidFill>
+          <a:ln>
+            <a:solidFill>
+              <a:schemeClr val="bg1"/>
+            </a:solidFill>
+          </a:ln>
+        </p:spPr>
+        <p:style>
+          <a:lnRef idx="2">
+            <a:schemeClr val="accent1">
+              <a:shade val="50000"/>
+            </a:schemeClr>
+          </a:lnRef>
+          <a:fillRef idx="1">
+            <a:schemeClr val="accent1"/>
+          </a:fillRef>
+          <a:effectRef idx="0">
+            <a:schemeClr val="accent1"/>
+          </a:effectRef>
+          <a:fontRef idx="minor">
+            <a:schemeClr val="lt1"/>
+          </a:fontRef>
+        </p:style>
+        <p:txBody>
+          <a:bodyPr rtlCol="0" anchor="ctr"/>
+          <a:lstStyle/>
+          <a:p>
+            <a:pPr algn="ctr"/>
+            <a:endParaRPr lang="fr-FR"/>
+          </a:p>
+        </p:txBody>
+      </p:sp>
+      <p:sp>
+        <p:nvSpPr>
+          <p:cNvPr id="10" name="Organigramme : Terminateur 9">
+            <a:extLst>
+              <a:ext uri="{FF2B5EF4-FFF2-40B4-BE49-F238E27FC236}">
+                <a16:creationId xmlns:a16="http://schemas.microsoft.com/office/drawing/2014/main" id="{CB8C87E6-B87B-4E15-81CC-6DBA23DB12CA}"/>
+              </a:ext>
+            </a:extLst>
+          </p:cNvPr>
+          <p:cNvSpPr/>
+          <p:nvPr/>
+        </p:nvSpPr>
+        <p:spPr>
+          <a:xfrm>
+            <a:off x="11405114" y="2347824"/>
+            <a:ext cx="358259" cy="85725"/>
+          </a:xfrm>
+          <a:prstGeom prst="flowChartTerminator">
+            <a:avLst/>
+          </a:prstGeom>
+          <a:solidFill>
+            <a:srgbClr val="A8135A"/>
+          </a:solidFill>
+          <a:ln>
+            <a:solidFill>
+              <a:schemeClr val="bg1"/>
+            </a:solidFill>
+          </a:ln>
+        </p:spPr>
+        <p:style>
+          <a:lnRef idx="2">
+            <a:schemeClr val="accent1">
+              <a:shade val="50000"/>
+            </a:schemeClr>
+          </a:lnRef>
+          <a:fillRef idx="1">
+            <a:schemeClr val="accent1"/>
+          </a:fillRef>
+          <a:effectRef idx="0">
+            <a:schemeClr val="accent1"/>
+          </a:effectRef>
+          <a:fontRef idx="minor">
+            <a:schemeClr val="lt1"/>
+          </a:fontRef>
+        </p:style>
+        <p:txBody>
+          <a:bodyPr rtlCol="0" anchor="ctr"/>
+          <a:lstStyle/>
+          <a:p>
+            <a:pPr algn="ctr"/>
+            <a:endParaRPr lang="fr-FR"/>
+          </a:p>
+        </p:txBody>
+      </p:sp>
+      <p:sp>
+        <p:nvSpPr>
+          <p:cNvPr id="11" name="ZoneTexte 10">
+            <a:extLst>
+              <a:ext uri="{FF2B5EF4-FFF2-40B4-BE49-F238E27FC236}">
+                <a16:creationId xmlns:a16="http://schemas.microsoft.com/office/drawing/2014/main" id="{470680A5-31CA-4A5F-A91F-7E3BEF289E7E}"/>
+              </a:ext>
+            </a:extLst>
+          </p:cNvPr>
+          <p:cNvSpPr txBox="1"/>
+          <p:nvPr/>
+        </p:nvSpPr>
+        <p:spPr>
+          <a:xfrm>
+            <a:off x="10299143" y="558449"/>
+            <a:ext cx="1129785" cy="461665"/>
+          </a:xfrm>
+          <a:prstGeom prst="rect">
+            <a:avLst/>
+          </a:prstGeom>
+          <a:noFill/>
+        </p:spPr>
+        <p:txBody>
+          <a:bodyPr wrap="square" rtlCol="0">
+            <a:spAutoFit/>
+          </a:bodyPr>
+          <a:lstStyle/>
+          <a:p>
+            <a:pPr algn="r"/>
+            <a:r>
+              <a:rPr lang="fr-FR" sz="1200" dirty="0">
+                <a:latin typeface="Eras Medium ITC" panose="020B0602030504020804" pitchFamily="34" charset="0"/>
+              </a:rPr>
+              <a:t>Présentation du projet</a:t>
+            </a:r>
+          </a:p>
+        </p:txBody>
+      </p:sp>
+      <p:sp>
+        <p:nvSpPr>
+          <p:cNvPr id="12" name="ZoneTexte 11">
+            <a:extLst>
+              <a:ext uri="{FF2B5EF4-FFF2-40B4-BE49-F238E27FC236}">
+                <a16:creationId xmlns:a16="http://schemas.microsoft.com/office/drawing/2014/main" id="{118F324A-9355-4439-8D28-46B0B893CC58}"/>
+              </a:ext>
+            </a:extLst>
+          </p:cNvPr>
+          <p:cNvSpPr txBox="1"/>
+          <p:nvPr/>
+        </p:nvSpPr>
+        <p:spPr>
+          <a:xfrm>
+            <a:off x="10275329" y="1418837"/>
+            <a:ext cx="1129785" cy="276999"/>
+          </a:xfrm>
+          <a:prstGeom prst="rect">
+            <a:avLst/>
+          </a:prstGeom>
+          <a:noFill/>
+        </p:spPr>
+        <p:txBody>
+          <a:bodyPr wrap="square" rtlCol="0">
+            <a:spAutoFit/>
+          </a:bodyPr>
+          <a:lstStyle/>
+          <a:p>
+            <a:pPr algn="r"/>
+            <a:r>
+              <a:rPr lang="fr-FR" sz="1200" dirty="0">
+                <a:latin typeface="Eras Medium ITC" panose="020B0602030504020804" pitchFamily="34" charset="0"/>
+              </a:rPr>
+              <a:t>Générale</a:t>
+            </a:r>
+          </a:p>
+        </p:txBody>
+      </p:sp>
+      <p:sp>
+        <p:nvSpPr>
+          <p:cNvPr id="13" name="ZoneTexte 12">
+            <a:extLst>
+              <a:ext uri="{FF2B5EF4-FFF2-40B4-BE49-F238E27FC236}">
+                <a16:creationId xmlns:a16="http://schemas.microsoft.com/office/drawing/2014/main" id="{B0B65B09-BAE9-45E1-8DDD-BE198E82EA10}"/>
+              </a:ext>
+            </a:extLst>
+          </p:cNvPr>
+          <p:cNvSpPr txBox="1"/>
+          <p:nvPr/>
+        </p:nvSpPr>
+        <p:spPr>
+          <a:xfrm>
+            <a:off x="10310812" y="2252186"/>
+            <a:ext cx="1129785" cy="276999"/>
+          </a:xfrm>
+          <a:prstGeom prst="rect">
+            <a:avLst/>
+          </a:prstGeom>
+          <a:noFill/>
+        </p:spPr>
+        <p:txBody>
+          <a:bodyPr wrap="square" rtlCol="0">
+            <a:spAutoFit/>
+          </a:bodyPr>
+          <a:lstStyle/>
+          <a:p>
+            <a:pPr algn="r"/>
+            <a:r>
+              <a:rPr lang="fr-FR" sz="1200" dirty="0">
+                <a:latin typeface="Eras Medium ITC" panose="020B0602030504020804" pitchFamily="34" charset="0"/>
+              </a:rPr>
+              <a:t>Personnalisée</a:t>
+            </a:r>
+          </a:p>
+        </p:txBody>
+      </p:sp>
+      <p:sp>
+        <p:nvSpPr>
+          <p:cNvPr id="14" name="ZoneTexte 13">
+            <a:extLst>
+              <a:ext uri="{FF2B5EF4-FFF2-40B4-BE49-F238E27FC236}">
+                <a16:creationId xmlns:a16="http://schemas.microsoft.com/office/drawing/2014/main" id="{B5E860DF-2164-46BA-A256-EAAC919881DC}"/>
+              </a:ext>
+            </a:extLst>
+          </p:cNvPr>
+          <p:cNvSpPr txBox="1"/>
+          <p:nvPr/>
+        </p:nvSpPr>
+        <p:spPr>
+          <a:xfrm>
+            <a:off x="10113406" y="3241822"/>
+            <a:ext cx="1315522" cy="461665"/>
+          </a:xfrm>
+          <a:prstGeom prst="rect">
+            <a:avLst/>
+          </a:prstGeom>
+          <a:noFill/>
+        </p:spPr>
+        <p:txBody>
+          <a:bodyPr wrap="square" rtlCol="0">
+            <a:spAutoFit/>
+          </a:bodyPr>
+          <a:lstStyle/>
+          <a:p>
+            <a:pPr algn="r"/>
+            <a:r>
+              <a:rPr lang="fr-FR" sz="1200" dirty="0">
+                <a:latin typeface="Eras Medium ITC" panose="020B0602030504020804" pitchFamily="34" charset="0"/>
+              </a:rPr>
+              <a:t>Diagramme de cas d’utilisation</a:t>
+            </a:r>
+          </a:p>
+        </p:txBody>
+      </p:sp>
+      <p:sp>
+        <p:nvSpPr>
+          <p:cNvPr id="15" name="ZoneTexte 14">
+            <a:extLst>
+              <a:ext uri="{FF2B5EF4-FFF2-40B4-BE49-F238E27FC236}">
+                <a16:creationId xmlns:a16="http://schemas.microsoft.com/office/drawing/2014/main" id="{0E549171-6603-40D1-AACC-954D9ECD3358}"/>
+              </a:ext>
+            </a:extLst>
+          </p:cNvPr>
+          <p:cNvSpPr txBox="1"/>
+          <p:nvPr/>
+        </p:nvSpPr>
+        <p:spPr>
+          <a:xfrm>
+            <a:off x="10299143" y="5892329"/>
+            <a:ext cx="1129785" cy="461665"/>
+          </a:xfrm>
+          <a:prstGeom prst="rect">
+            <a:avLst/>
+          </a:prstGeom>
+          <a:noFill/>
+        </p:spPr>
+        <p:txBody>
+          <a:bodyPr wrap="square" rtlCol="0">
+            <a:spAutoFit/>
+          </a:bodyPr>
+          <a:lstStyle/>
+          <a:p>
+            <a:pPr algn="r"/>
+            <a:r>
+              <a:rPr lang="fr-FR" sz="1200" dirty="0">
+                <a:latin typeface="Eras Medium ITC" panose="020B0602030504020804" pitchFamily="34" charset="0"/>
+              </a:rPr>
+              <a:t>Les tâches personnelles</a:t>
+            </a:r>
+          </a:p>
+        </p:txBody>
+      </p:sp>
+      <p:sp>
+        <p:nvSpPr>
+          <p:cNvPr id="16" name="Rectangle 15">
+            <a:extLst>
+              <a:ext uri="{FF2B5EF4-FFF2-40B4-BE49-F238E27FC236}">
+                <a16:creationId xmlns:a16="http://schemas.microsoft.com/office/drawing/2014/main" id="{1D13FD37-1228-4A08-9F72-D32CBA322FEC}"/>
+              </a:ext>
+            </a:extLst>
+          </p:cNvPr>
+          <p:cNvSpPr/>
+          <p:nvPr/>
+        </p:nvSpPr>
+        <p:spPr>
+          <a:xfrm>
+            <a:off x="11658600" y="955383"/>
+            <a:ext cx="104773" cy="2245810"/>
+          </a:xfrm>
+          <a:prstGeom prst="rect">
+            <a:avLst/>
+          </a:prstGeom>
+          <a:solidFill>
+            <a:srgbClr val="A8135A"/>
+          </a:solidFill>
+          <a:ln>
+            <a:solidFill>
+              <a:schemeClr val="bg1"/>
+            </a:solidFill>
+          </a:ln>
+        </p:spPr>
+        <p:style>
+          <a:lnRef idx="2">
+            <a:schemeClr val="accent1">
+              <a:shade val="50000"/>
+            </a:schemeClr>
+          </a:lnRef>
+          <a:fillRef idx="1">
+            <a:schemeClr val="accent1"/>
+          </a:fillRef>
+          <a:effectRef idx="0">
+            <a:schemeClr val="accent1"/>
+          </a:effectRef>
+          <a:fontRef idx="minor">
+            <a:schemeClr val="lt1"/>
+          </a:fontRef>
+        </p:style>
+        <p:txBody>
+          <a:bodyPr rtlCol="0" anchor="ctr"/>
+          <a:lstStyle/>
+          <a:p>
+            <a:pPr algn="ctr"/>
+            <a:endParaRPr lang="fr-FR"/>
+          </a:p>
+        </p:txBody>
+      </p:sp>
+      <p:sp>
+        <p:nvSpPr>
+          <p:cNvPr id="17" name="Ellipse 16">
+            <a:extLst>
+              <a:ext uri="{FF2B5EF4-FFF2-40B4-BE49-F238E27FC236}">
+                <a16:creationId xmlns:a16="http://schemas.microsoft.com/office/drawing/2014/main" id="{9F704096-5C9D-41FD-B6A4-68CA21735651}"/>
+              </a:ext>
+            </a:extLst>
+          </p:cNvPr>
+          <p:cNvSpPr/>
+          <p:nvPr/>
+        </p:nvSpPr>
+        <p:spPr>
+          <a:xfrm>
+            <a:off x="11428928" y="550687"/>
+            <a:ext cx="564118" cy="542925"/>
+          </a:xfrm>
+          <a:prstGeom prst="ellipse">
+            <a:avLst/>
+          </a:prstGeom>
+          <a:solidFill>
+            <a:srgbClr val="A8135A"/>
+          </a:solidFill>
+          <a:ln>
+            <a:solidFill>
+              <a:schemeClr val="bg1"/>
+            </a:solidFill>
+          </a:ln>
+        </p:spPr>
+        <p:style>
+          <a:lnRef idx="2">
+            <a:schemeClr val="accent1">
+              <a:shade val="50000"/>
+            </a:schemeClr>
+          </a:lnRef>
+          <a:fillRef idx="1">
+            <a:schemeClr val="accent1"/>
+          </a:fillRef>
+          <a:effectRef idx="0">
+            <a:schemeClr val="accent1"/>
+          </a:effectRef>
+          <a:fontRef idx="minor">
+            <a:schemeClr val="lt1"/>
+          </a:fontRef>
+        </p:style>
+        <p:txBody>
+          <a:bodyPr rtlCol="0" anchor="ctr"/>
+          <a:lstStyle/>
+          <a:p>
+            <a:pPr algn="ctr"/>
+            <a:endParaRPr lang="fr-FR"/>
+          </a:p>
+        </p:txBody>
+      </p:sp>
+      <p:sp>
+        <p:nvSpPr>
+          <p:cNvPr id="8" name="Ellipse 7">
+            <a:extLst>
+              <a:ext uri="{FF2B5EF4-FFF2-40B4-BE49-F238E27FC236}">
+                <a16:creationId xmlns:a16="http://schemas.microsoft.com/office/drawing/2014/main" id="{527A32BE-E971-4F22-BE27-E8B13A47BF8B}"/>
+              </a:ext>
+            </a:extLst>
+          </p:cNvPr>
+          <p:cNvSpPr/>
+          <p:nvPr/>
+        </p:nvSpPr>
+        <p:spPr>
+          <a:xfrm>
+            <a:off x="11428928" y="3201193"/>
+            <a:ext cx="564118" cy="542925"/>
+          </a:xfrm>
+          <a:prstGeom prst="ellipse">
+            <a:avLst/>
+          </a:prstGeom>
+          <a:solidFill>
+            <a:srgbClr val="A8135A"/>
+          </a:solidFill>
+          <a:ln>
+            <a:solidFill>
+              <a:schemeClr val="bg1"/>
+            </a:solidFill>
+          </a:ln>
+        </p:spPr>
+        <p:style>
+          <a:lnRef idx="2">
+            <a:schemeClr val="accent1">
+              <a:shade val="50000"/>
+            </a:schemeClr>
+          </a:lnRef>
+          <a:fillRef idx="1">
+            <a:schemeClr val="accent1"/>
+          </a:fillRef>
+          <a:effectRef idx="0">
+            <a:schemeClr val="accent1"/>
+          </a:effectRef>
+          <a:fontRef idx="minor">
+            <a:schemeClr val="lt1"/>
+          </a:fontRef>
+        </p:style>
+        <p:txBody>
+          <a:bodyPr rtlCol="0" anchor="ctr"/>
+          <a:lstStyle/>
+          <a:p>
+            <a:pPr algn="ctr"/>
+            <a:endParaRPr lang="fr-FR"/>
+          </a:p>
+        </p:txBody>
+      </p:sp>
+      <p:pic>
+        <p:nvPicPr>
+          <p:cNvPr id="4" name="Image 3">
+            <a:extLst>
+              <a:ext uri="{FF2B5EF4-FFF2-40B4-BE49-F238E27FC236}">
+                <a16:creationId xmlns:a16="http://schemas.microsoft.com/office/drawing/2014/main" id="{F6F50CF8-8F97-49CE-8AC9-109901FFB29C}"/>
+              </a:ext>
+            </a:extLst>
+          </p:cNvPr>
+          <p:cNvPicPr>
+            <a:picLocks noChangeAspect="1"/>
+          </p:cNvPicPr>
+          <p:nvPr/>
+        </p:nvPicPr>
+        <p:blipFill rotWithShape="1">
+          <a:blip r:embed="rId3"/>
+          <a:srcRect t="63122" r="7042" b="1467"/>
+          <a:stretch/>
+        </p:blipFill>
+        <p:spPr>
+          <a:xfrm>
+            <a:off x="751403" y="1600200"/>
+            <a:ext cx="8968354" cy="4535424"/>
+          </a:xfrm>
+          <a:prstGeom prst="rect">
+            <a:avLst/>
+          </a:prstGeom>
+        </p:spPr>
+      </p:pic>
+    </p:spTree>
+    <p:extLst>
+      <p:ext uri="{BB962C8B-B14F-4D97-AF65-F5344CB8AC3E}">
+        <p14:creationId xmlns:p14="http://schemas.microsoft.com/office/powerpoint/2010/main" val="673851662"/>
+      </p:ext>
+    </p:extLst>
+  </p:cSld>
+  <p:clrMapOvr>
+    <a:masterClrMapping/>
+  </p:clrMapOvr>
+  <mc:AlternateContent xmlns:mc="http://schemas.openxmlformats.org/markup-compatibility/2006" xmlns:p159="http://schemas.microsoft.com/office/powerpoint/2015/09/main">
+    <mc:Choice Requires="p159">
+      <p:transition xmlns:p14="http://schemas.microsoft.com/office/powerpoint/2010/main" spd="slow" p14:dur="2000">
+        <p159:morph option="byObject"/>
+      </p:transition>
+    </mc:Choice>
+    <mc:Fallback xmlns="">
+      <p:transition spd="slow">
+        <p:fade/>
+      </p:transition>
+    </mc:Fallback>
+  </mc:AlternateContent>
+</p:sld>
+</file>
+
+<file path=ppt/slides/slide12.xml><?xml version="1.0" encoding="utf-8"?>
+<p:sld xmlns:a="http://schemas.openxmlformats.org/drawingml/2006/main" xmlns:r="http://schemas.openxmlformats.org/officeDocument/2006/relationships" xmlns:p="http://schemas.openxmlformats.org/presentationml/2006/main">
+  <p:cSld>
+    <p:spTree>
+      <p:nvGrpSpPr>
+        <p:cNvPr id="1" name=""/>
+        <p:cNvGrpSpPr/>
+        <p:nvPr/>
+      </p:nvGrpSpPr>
+      <p:grpSpPr>
+        <a:xfrm>
+          <a:off x="0" y="0"/>
+          <a:ext cx="0" cy="0"/>
+          <a:chOff x="0" y="0"/>
+          <a:chExt cx="0" cy="0"/>
+        </a:xfrm>
+      </p:grpSpPr>
+      <p:pic>
+        <p:nvPicPr>
+          <p:cNvPr id="1026" name="Picture 2" descr="Image associée">
+            <a:extLst>
+              <a:ext uri="{FF2B5EF4-FFF2-40B4-BE49-F238E27FC236}">
+                <a16:creationId xmlns:a16="http://schemas.microsoft.com/office/drawing/2014/main" id="{C816F3D8-CC4C-46B3-A21E-58AE9AD30454}"/>
+              </a:ext>
+            </a:extLst>
+          </p:cNvPr>
+          <p:cNvPicPr>
+            <a:picLocks noChangeAspect="1" noChangeArrowheads="1"/>
+          </p:cNvPicPr>
+          <p:nvPr/>
+        </p:nvPicPr>
+        <p:blipFill rotWithShape="1">
+          <a:blip r:embed="rId2">
+            <a:extLst>
+              <a:ext uri="{28A0092B-C50C-407E-A947-70E740481C1C}">
+                <a14:useLocalDpi xmlns:a14="http://schemas.microsoft.com/office/drawing/2010/main" val="0"/>
+              </a:ext>
+            </a:extLst>
+          </a:blip>
+          <a:srcRect l="18677" r="15441"/>
+          <a:stretch/>
+        </p:blipFill>
+        <p:spPr bwMode="auto">
+          <a:xfrm>
+            <a:off x="143436" y="143435"/>
+            <a:ext cx="2269635" cy="609600"/>
+          </a:xfrm>
+          <a:prstGeom prst="rect">
+            <a:avLst/>
+          </a:prstGeom>
+          <a:noFill/>
+          <a:extLst>
+            <a:ext uri="{909E8E84-426E-40DD-AFC4-6F175D3DCCD1}">
+              <a14:hiddenFill xmlns:a14="http://schemas.microsoft.com/office/drawing/2010/main">
+                <a:solidFill>
+                  <a:srgbClr val="FFFFFF"/>
+                </a:solidFill>
+              </a14:hiddenFill>
+            </a:ext>
+          </a:extLst>
+        </p:spPr>
+      </p:pic>
+      <p:sp>
+        <p:nvSpPr>
+          <p:cNvPr id="2" name="ZoneTexte 1">
+            <a:extLst>
+              <a:ext uri="{FF2B5EF4-FFF2-40B4-BE49-F238E27FC236}">
+                <a16:creationId xmlns:a16="http://schemas.microsoft.com/office/drawing/2014/main" id="{144597CC-5B36-42C7-952E-C2CE1E34CACD}"/>
+              </a:ext>
+            </a:extLst>
+          </p:cNvPr>
+          <p:cNvSpPr txBox="1"/>
+          <p:nvPr/>
+        </p:nvSpPr>
+        <p:spPr>
+          <a:xfrm>
             <a:off x="2587752" y="143435"/>
             <a:ext cx="6437376" cy="1077218"/>
           </a:xfrm>
@@ -13060,7 +14622,7 @@
         <p:spPr>
           <a:xfrm>
             <a:off x="2587752" y="143435"/>
-            <a:ext cx="6437376" cy="646331"/>
+            <a:ext cx="6437376" cy="1077218"/>
           </a:xfrm>
           <a:prstGeom prst="rect">
             <a:avLst/>
@@ -13075,7 +14637,7 @@
           <a:p>
             <a:pPr algn="ctr"/>
             <a:r>
-              <a:rPr lang="fr-FR" sz="3600" b="1" dirty="0">
+              <a:rPr lang="fr-FR" sz="3200" b="1" dirty="0">
                 <a:effectLst>
                   <a:outerShdw blurRad="38100" dist="38100" dir="2700000" algn="tl">
                     <a:srgbClr val="000000">
@@ -13085,12 +14647,12 @@
                 </a:effectLst>
                 <a:latin typeface="Eras Medium ITC" panose="020B0602030504020804" pitchFamily="34" charset="0"/>
               </a:rPr>
-              <a:t>Diagramme de cas </a:t>
-            </a:r>
-            <a:r>
-              <a:rPr lang="fr-FR" sz="3600" b="1" dirty="0">
+              <a:t>Langage de </a:t>
+            </a:r>
+            <a:r>
+              <a:rPr lang="fr-FR" sz="3200" b="1" dirty="0">
                 <a:solidFill>
-                  <a:srgbClr val="A31257"/>
+                  <a:srgbClr val="A51258"/>
                 </a:solidFill>
                 <a:effectLst>
                   <a:outerShdw blurRad="38100" dist="38100" dir="2700000" algn="tl">
@@ -13101,10 +14663,13 @@
                 </a:effectLst>
                 <a:latin typeface="Eras Medium ITC" panose="020B0602030504020804" pitchFamily="34" charset="0"/>
               </a:rPr>
-              <a:t>d’utilisation</a:t>
-            </a:r>
-            <a:r>
-              <a:rPr lang="fr-FR" sz="3600" b="1" dirty="0">
+              <a:t>développement 1</a:t>
+            </a:r>
+            <a:r>
+              <a:rPr lang="fr-FR" sz="3200" b="1" baseline="30000" dirty="0">
+                <a:solidFill>
+                  <a:srgbClr val="A51258"/>
+                </a:solidFill>
                 <a:effectLst>
                   <a:outerShdw blurRad="38100" dist="38100" dir="2700000" algn="tl">
                     <a:srgbClr val="000000">
@@ -13114,40 +14679,40 @@
                 </a:effectLst>
                 <a:latin typeface="Eras Medium ITC" panose="020B0602030504020804" pitchFamily="34" charset="0"/>
               </a:rPr>
-              <a:t>  </a:t>
-            </a:r>
-          </a:p>
-        </p:txBody>
-      </p:sp>
-      <p:pic>
-        <p:nvPicPr>
-          <p:cNvPr id="5" name="Image 4" descr="Une image contenant texte, carte, capture d’écran&#10;&#10;Description générée automatiquement">
-            <a:extLst>
-              <a:ext uri="{FF2B5EF4-FFF2-40B4-BE49-F238E27FC236}">
-                <a16:creationId xmlns:a16="http://schemas.microsoft.com/office/drawing/2014/main" id="{F3CC10DC-37D4-43BE-BB94-2AA6BA44EF0A}"/>
-              </a:ext>
-            </a:extLst>
-          </p:cNvPr>
-          <p:cNvPicPr>
-            <a:picLocks noChangeAspect="1"/>
-          </p:cNvPicPr>
-          <p:nvPr/>
-        </p:nvPicPr>
-        <p:blipFill rotWithShape="1">
-          <a:blip r:embed="rId3"/>
-          <a:srcRect l="1206" t="3761" r="2523" b="2393"/>
-          <a:stretch/>
-        </p:blipFill>
-        <p:spPr>
-          <a:xfrm>
-            <a:off x="2796424" y="1022694"/>
-            <a:ext cx="4798345" cy="5405538"/>
-          </a:xfrm>
-          <a:prstGeom prst="rect">
-            <a:avLst/>
-          </a:prstGeom>
-        </p:spPr>
-      </p:pic>
+              <a:t>er </a:t>
+            </a:r>
+            <a:r>
+              <a:rPr lang="fr-FR" sz="3200" b="1" dirty="0">
+                <a:solidFill>
+                  <a:srgbClr val="A51258"/>
+                </a:solidFill>
+                <a:effectLst>
+                  <a:outerShdw blurRad="38100" dist="38100" dir="2700000" algn="tl">
+                    <a:srgbClr val="000000">
+                      <a:alpha val="43137"/>
+                    </a:srgbClr>
+                  </a:outerShdw>
+                </a:effectLst>
+                <a:latin typeface="Eras Medium ITC" panose="020B0602030504020804" pitchFamily="34" charset="0"/>
+              </a:rPr>
+              <a:t>environnement</a:t>
+            </a:r>
+            <a:endParaRPr lang="fr-FR" sz="2400" b="1" baseline="30000" dirty="0">
+              <a:solidFill>
+                <a:srgbClr val="A51258"/>
+              </a:solidFill>
+              <a:effectLst>
+                <a:outerShdw blurRad="38100" dist="38100" dir="2700000" algn="tl">
+                  <a:srgbClr val="000000">
+                    <a:alpha val="43137"/>
+                  </a:srgbClr>
+                </a:outerShdw>
+              </a:effectLst>
+              <a:latin typeface="Eras Medium ITC" panose="020B0602030504020804" pitchFamily="34" charset="0"/>
+            </a:endParaRPr>
+          </a:p>
+        </p:txBody>
+      </p:sp>
       <p:sp>
         <p:nvSpPr>
           <p:cNvPr id="6" name="Organigramme : Terminateur 5">
@@ -13716,10 +15281,571 @@
           </a:p>
         </p:txBody>
       </p:sp>
+      <p:sp>
+        <p:nvSpPr>
+          <p:cNvPr id="3" name="Rectangle 2">
+            <a:extLst>
+              <a:ext uri="{FF2B5EF4-FFF2-40B4-BE49-F238E27FC236}">
+                <a16:creationId xmlns:a16="http://schemas.microsoft.com/office/drawing/2014/main" id="{D36F0F8B-9F16-4C37-87CF-5E71B402E9F6}"/>
+              </a:ext>
+            </a:extLst>
+          </p:cNvPr>
+          <p:cNvSpPr/>
+          <p:nvPr/>
+        </p:nvSpPr>
+        <p:spPr>
+          <a:xfrm>
+            <a:off x="615141" y="1614551"/>
+            <a:ext cx="1446370" cy="772543"/>
+          </a:xfrm>
+          <a:prstGeom prst="rect">
+            <a:avLst/>
+          </a:prstGeom>
+          <a:noFill/>
+          <a:ln w="28575">
+            <a:solidFill>
+              <a:srgbClr val="A51258"/>
+            </a:solidFill>
+          </a:ln>
+          <a:effectLst>
+            <a:glow rad="50800">
+              <a:schemeClr val="tx1"/>
+            </a:glow>
+          </a:effectLst>
+        </p:spPr>
+        <p:style>
+          <a:lnRef idx="2">
+            <a:schemeClr val="accent1">
+              <a:shade val="50000"/>
+            </a:schemeClr>
+          </a:lnRef>
+          <a:fillRef idx="1">
+            <a:schemeClr val="accent1"/>
+          </a:fillRef>
+          <a:effectRef idx="0">
+            <a:schemeClr val="accent1"/>
+          </a:effectRef>
+          <a:fontRef idx="minor">
+            <a:schemeClr val="lt1"/>
+          </a:fontRef>
+        </p:style>
+        <p:txBody>
+          <a:bodyPr rtlCol="0" anchor="ctr"/>
+          <a:lstStyle/>
+          <a:p>
+            <a:pPr algn="ctr"/>
+            <a:r>
+              <a:rPr lang="fr-FR" sz="1400" dirty="0">
+                <a:solidFill>
+                  <a:schemeClr val="tx1"/>
+                </a:solidFill>
+              </a:rPr>
+              <a:t>Développement sous </a:t>
+            </a:r>
+            <a:r>
+              <a:rPr lang="fr-FR" sz="1400" dirty="0">
+                <a:solidFill>
+                  <a:srgbClr val="A51258"/>
+                </a:solidFill>
+              </a:rPr>
+              <a:t>Raspbian</a:t>
+            </a:r>
+          </a:p>
+        </p:txBody>
+      </p:sp>
+      <p:pic>
+        <p:nvPicPr>
+          <p:cNvPr id="19" name="Image 18" descr="Une image contenant dessin&#10;&#10;Description générée automatiquement">
+            <a:extLst>
+              <a:ext uri="{FF2B5EF4-FFF2-40B4-BE49-F238E27FC236}">
+                <a16:creationId xmlns:a16="http://schemas.microsoft.com/office/drawing/2014/main" id="{9CD770EB-39C8-4961-A975-D81FE177F6E6}"/>
+              </a:ext>
+            </a:extLst>
+          </p:cNvPr>
+          <p:cNvPicPr>
+            <a:picLocks noChangeAspect="1"/>
+          </p:cNvPicPr>
+          <p:nvPr/>
+        </p:nvPicPr>
+        <p:blipFill>
+          <a:blip r:embed="rId3"/>
+          <a:stretch>
+            <a:fillRect/>
+          </a:stretch>
+        </p:blipFill>
+        <p:spPr>
+          <a:xfrm>
+            <a:off x="4076372" y="1479205"/>
+            <a:ext cx="1848015" cy="1043233"/>
+          </a:xfrm>
+          <a:prstGeom prst="rect">
+            <a:avLst/>
+          </a:prstGeom>
+        </p:spPr>
+      </p:pic>
+      <p:cxnSp>
+        <p:nvCxnSpPr>
+          <p:cNvPr id="21" name="Connecteur droit avec flèche 20">
+            <a:extLst>
+              <a:ext uri="{FF2B5EF4-FFF2-40B4-BE49-F238E27FC236}">
+                <a16:creationId xmlns:a16="http://schemas.microsoft.com/office/drawing/2014/main" id="{B432392D-CDA4-4EF2-B283-182EA7C95F6D}"/>
+              </a:ext>
+            </a:extLst>
+          </p:cNvPr>
+          <p:cNvCxnSpPr>
+            <a:cxnSpLocks/>
+            <a:stCxn id="3" idx="3"/>
+            <a:endCxn id="19" idx="1"/>
+          </p:cNvCxnSpPr>
+          <p:nvPr/>
+        </p:nvCxnSpPr>
+        <p:spPr>
+          <a:xfrm flipV="1">
+            <a:off x="2061511" y="2000822"/>
+            <a:ext cx="2014861" cy="1"/>
+          </a:xfrm>
+          <a:prstGeom prst="straightConnector1">
+            <a:avLst/>
+          </a:prstGeom>
+          <a:ln w="38100">
+            <a:solidFill>
+              <a:srgbClr val="A51258"/>
+            </a:solidFill>
+            <a:tailEnd type="triangle"/>
+          </a:ln>
+          <a:effectLst>
+            <a:glow rad="50800">
+              <a:schemeClr val="tx1"/>
+            </a:glow>
+          </a:effectLst>
+        </p:spPr>
+        <p:style>
+          <a:lnRef idx="1">
+            <a:schemeClr val="accent1"/>
+          </a:lnRef>
+          <a:fillRef idx="0">
+            <a:schemeClr val="accent1"/>
+          </a:fillRef>
+          <a:effectRef idx="0">
+            <a:schemeClr val="accent1"/>
+          </a:effectRef>
+          <a:fontRef idx="minor">
+            <a:schemeClr val="tx1"/>
+          </a:fontRef>
+        </p:style>
+      </p:cxnSp>
+      <p:sp>
+        <p:nvSpPr>
+          <p:cNvPr id="28" name="Rectangle 27">
+            <a:extLst>
+              <a:ext uri="{FF2B5EF4-FFF2-40B4-BE49-F238E27FC236}">
+                <a16:creationId xmlns:a16="http://schemas.microsoft.com/office/drawing/2014/main" id="{E25BD09E-F0C0-48E4-A20E-9726A94F44B7}"/>
+              </a:ext>
+            </a:extLst>
+          </p:cNvPr>
+          <p:cNvSpPr/>
+          <p:nvPr/>
+        </p:nvSpPr>
+        <p:spPr>
+          <a:xfrm>
+            <a:off x="615141" y="3310821"/>
+            <a:ext cx="1444662" cy="772542"/>
+          </a:xfrm>
+          <a:prstGeom prst="rect">
+            <a:avLst/>
+          </a:prstGeom>
+          <a:noFill/>
+          <a:ln w="28575">
+            <a:solidFill>
+              <a:srgbClr val="A51258"/>
+            </a:solidFill>
+          </a:ln>
+          <a:effectLst>
+            <a:glow rad="50800">
+              <a:schemeClr val="tx1"/>
+            </a:glow>
+          </a:effectLst>
+        </p:spPr>
+        <p:style>
+          <a:lnRef idx="2">
+            <a:schemeClr val="accent1">
+              <a:shade val="50000"/>
+            </a:schemeClr>
+          </a:lnRef>
+          <a:fillRef idx="1">
+            <a:schemeClr val="accent1"/>
+          </a:fillRef>
+          <a:effectRef idx="0">
+            <a:schemeClr val="accent1"/>
+          </a:effectRef>
+          <a:fontRef idx="minor">
+            <a:schemeClr val="lt1"/>
+          </a:fontRef>
+        </p:style>
+        <p:txBody>
+          <a:bodyPr rtlCol="0" anchor="ctr"/>
+          <a:lstStyle/>
+          <a:p>
+            <a:pPr algn="ctr"/>
+            <a:r>
+              <a:rPr lang="fr-FR" sz="1400" dirty="0">
+                <a:solidFill>
+                  <a:schemeClr val="tx1"/>
+                </a:solidFill>
+              </a:rPr>
+              <a:t>En </a:t>
+            </a:r>
+            <a:r>
+              <a:rPr lang="fr-FR" sz="1400" dirty="0">
+                <a:solidFill>
+                  <a:srgbClr val="A51258"/>
+                </a:solidFill>
+              </a:rPr>
+              <a:t>Python</a:t>
+            </a:r>
+          </a:p>
+        </p:txBody>
+      </p:sp>
+      <p:cxnSp>
+        <p:nvCxnSpPr>
+          <p:cNvPr id="29" name="Connecteur droit avec flèche 28">
+            <a:extLst>
+              <a:ext uri="{FF2B5EF4-FFF2-40B4-BE49-F238E27FC236}">
+                <a16:creationId xmlns:a16="http://schemas.microsoft.com/office/drawing/2014/main" id="{2E254BEC-E913-4433-AF37-9E11336C361F}"/>
+              </a:ext>
+            </a:extLst>
+          </p:cNvPr>
+          <p:cNvCxnSpPr>
+            <a:cxnSpLocks/>
+            <a:stCxn id="28" idx="3"/>
+            <a:endCxn id="1024" idx="1"/>
+          </p:cNvCxnSpPr>
+          <p:nvPr/>
+        </p:nvCxnSpPr>
+        <p:spPr>
+          <a:xfrm>
+            <a:off x="2059803" y="3697092"/>
+            <a:ext cx="2889820" cy="0"/>
+          </a:xfrm>
+          <a:prstGeom prst="straightConnector1">
+            <a:avLst/>
+          </a:prstGeom>
+          <a:ln w="38100">
+            <a:solidFill>
+              <a:srgbClr val="A51258"/>
+            </a:solidFill>
+            <a:tailEnd type="triangle"/>
+          </a:ln>
+          <a:effectLst>
+            <a:glow rad="50800">
+              <a:schemeClr val="tx1"/>
+            </a:glow>
+          </a:effectLst>
+        </p:spPr>
+        <p:style>
+          <a:lnRef idx="1">
+            <a:schemeClr val="accent1"/>
+          </a:lnRef>
+          <a:fillRef idx="0">
+            <a:schemeClr val="accent1"/>
+          </a:fillRef>
+          <a:effectRef idx="0">
+            <a:schemeClr val="accent1"/>
+          </a:effectRef>
+          <a:fontRef idx="minor">
+            <a:schemeClr val="tx1"/>
+          </a:fontRef>
+        </p:style>
+      </p:cxnSp>
+      <p:pic>
+        <p:nvPicPr>
+          <p:cNvPr id="1024" name="Image 1023">
+            <a:extLst>
+              <a:ext uri="{FF2B5EF4-FFF2-40B4-BE49-F238E27FC236}">
+                <a16:creationId xmlns:a16="http://schemas.microsoft.com/office/drawing/2014/main" id="{EBBE580E-AF9B-4527-BC42-179DD376C09A}"/>
+              </a:ext>
+            </a:extLst>
+          </p:cNvPr>
+          <p:cNvPicPr>
+            <a:picLocks noChangeAspect="1"/>
+          </p:cNvPicPr>
+          <p:nvPr/>
+        </p:nvPicPr>
+        <p:blipFill>
+          <a:blip r:embed="rId4"/>
+          <a:stretch>
+            <a:fillRect/>
+          </a:stretch>
+        </p:blipFill>
+        <p:spPr>
+          <a:xfrm>
+            <a:off x="4949623" y="3011420"/>
+            <a:ext cx="1310396" cy="1371344"/>
+          </a:xfrm>
+          <a:prstGeom prst="rect">
+            <a:avLst/>
+          </a:prstGeom>
+        </p:spPr>
+      </p:pic>
+      <p:cxnSp>
+        <p:nvCxnSpPr>
+          <p:cNvPr id="36" name="Connecteur droit avec flèche 35">
+            <a:extLst>
+              <a:ext uri="{FF2B5EF4-FFF2-40B4-BE49-F238E27FC236}">
+                <a16:creationId xmlns:a16="http://schemas.microsoft.com/office/drawing/2014/main" id="{33881EC8-C0C1-409C-9C50-5DC54E7D72F0}"/>
+              </a:ext>
+            </a:extLst>
+          </p:cNvPr>
+          <p:cNvCxnSpPr>
+            <a:cxnSpLocks/>
+            <a:stCxn id="3" idx="2"/>
+            <a:endCxn id="28" idx="0"/>
+          </p:cNvCxnSpPr>
+          <p:nvPr/>
+        </p:nvCxnSpPr>
+        <p:spPr>
+          <a:xfrm flipH="1">
+            <a:off x="1337472" y="2387094"/>
+            <a:ext cx="854" cy="923727"/>
+          </a:xfrm>
+          <a:prstGeom prst="straightConnector1">
+            <a:avLst/>
+          </a:prstGeom>
+          <a:ln w="38100">
+            <a:solidFill>
+              <a:srgbClr val="A51258"/>
+            </a:solidFill>
+            <a:tailEnd type="triangle"/>
+          </a:ln>
+          <a:effectLst>
+            <a:glow rad="50800">
+              <a:schemeClr val="tx1"/>
+            </a:glow>
+          </a:effectLst>
+        </p:spPr>
+        <p:style>
+          <a:lnRef idx="1">
+            <a:schemeClr val="accent1"/>
+          </a:lnRef>
+          <a:fillRef idx="0">
+            <a:schemeClr val="accent1"/>
+          </a:fillRef>
+          <a:effectRef idx="0">
+            <a:schemeClr val="accent1"/>
+          </a:effectRef>
+          <a:fontRef idx="minor">
+            <a:schemeClr val="tx1"/>
+          </a:fontRef>
+        </p:style>
+      </p:cxnSp>
+      <p:sp>
+        <p:nvSpPr>
+          <p:cNvPr id="39" name="Rectangle 38">
+            <a:extLst>
+              <a:ext uri="{FF2B5EF4-FFF2-40B4-BE49-F238E27FC236}">
+                <a16:creationId xmlns:a16="http://schemas.microsoft.com/office/drawing/2014/main" id="{842B3967-D030-492C-9567-7E58D43E4099}"/>
+              </a:ext>
+            </a:extLst>
+          </p:cNvPr>
+          <p:cNvSpPr/>
+          <p:nvPr/>
+        </p:nvSpPr>
+        <p:spPr>
+          <a:xfrm>
+            <a:off x="615141" y="5007091"/>
+            <a:ext cx="1444662" cy="772542"/>
+          </a:xfrm>
+          <a:prstGeom prst="rect">
+            <a:avLst/>
+          </a:prstGeom>
+          <a:noFill/>
+          <a:ln w="28575">
+            <a:solidFill>
+              <a:srgbClr val="A51258"/>
+            </a:solidFill>
+          </a:ln>
+          <a:effectLst>
+            <a:glow rad="50800">
+              <a:schemeClr val="tx1"/>
+            </a:glow>
+          </a:effectLst>
+        </p:spPr>
+        <p:style>
+          <a:lnRef idx="2">
+            <a:schemeClr val="accent1">
+              <a:shade val="50000"/>
+            </a:schemeClr>
+          </a:lnRef>
+          <a:fillRef idx="1">
+            <a:schemeClr val="accent1"/>
+          </a:fillRef>
+          <a:effectRef idx="0">
+            <a:schemeClr val="accent1"/>
+          </a:effectRef>
+          <a:fontRef idx="minor">
+            <a:schemeClr val="lt1"/>
+          </a:fontRef>
+        </p:style>
+        <p:txBody>
+          <a:bodyPr rtlCol="0" anchor="ctr"/>
+          <a:lstStyle/>
+          <a:p>
+            <a:pPr algn="ctr"/>
+            <a:r>
+              <a:rPr lang="fr-FR" sz="1400" dirty="0">
+                <a:solidFill>
+                  <a:schemeClr val="tx1"/>
+                </a:solidFill>
+              </a:rPr>
+              <a:t>Avec </a:t>
+            </a:r>
+            <a:r>
+              <a:rPr lang="fr-FR" sz="1400" dirty="0">
+                <a:solidFill>
+                  <a:srgbClr val="A51258"/>
+                </a:solidFill>
+              </a:rPr>
+              <a:t>Pycharm</a:t>
+            </a:r>
+          </a:p>
+        </p:txBody>
+      </p:sp>
+      <p:pic>
+        <p:nvPicPr>
+          <p:cNvPr id="1031" name="Image 1030" descr="Une image contenant dessin, signe&#10;&#10;Description générée automatiquement">
+            <a:extLst>
+              <a:ext uri="{FF2B5EF4-FFF2-40B4-BE49-F238E27FC236}">
+                <a16:creationId xmlns:a16="http://schemas.microsoft.com/office/drawing/2014/main" id="{7228FA1E-E3D5-496A-B23F-F12537FD9C4D}"/>
+              </a:ext>
+            </a:extLst>
+          </p:cNvPr>
+          <p:cNvPicPr>
+            <a:picLocks noChangeAspect="1"/>
+          </p:cNvPicPr>
+          <p:nvPr/>
+        </p:nvPicPr>
+        <p:blipFill>
+          <a:blip r:embed="rId5"/>
+          <a:stretch>
+            <a:fillRect/>
+          </a:stretch>
+        </p:blipFill>
+        <p:spPr>
+          <a:xfrm>
+            <a:off x="6502621" y="4785400"/>
+            <a:ext cx="1621232" cy="1215924"/>
+          </a:xfrm>
+          <a:prstGeom prst="rect">
+            <a:avLst/>
+          </a:prstGeom>
+        </p:spPr>
+      </p:pic>
+      <p:cxnSp>
+        <p:nvCxnSpPr>
+          <p:cNvPr id="45" name="Connecteur droit avec flèche 44">
+            <a:extLst>
+              <a:ext uri="{FF2B5EF4-FFF2-40B4-BE49-F238E27FC236}">
+                <a16:creationId xmlns:a16="http://schemas.microsoft.com/office/drawing/2014/main" id="{F4060EED-2CED-4349-9162-232E3292F492}"/>
+              </a:ext>
+            </a:extLst>
+          </p:cNvPr>
+          <p:cNvCxnSpPr>
+            <a:cxnSpLocks/>
+            <a:stCxn id="39" idx="3"/>
+            <a:endCxn id="1031" idx="1"/>
+          </p:cNvCxnSpPr>
+          <p:nvPr/>
+        </p:nvCxnSpPr>
+        <p:spPr>
+          <a:xfrm>
+            <a:off x="2059803" y="5393362"/>
+            <a:ext cx="4442818" cy="0"/>
+          </a:xfrm>
+          <a:prstGeom prst="straightConnector1">
+            <a:avLst/>
+          </a:prstGeom>
+          <a:ln w="38100">
+            <a:solidFill>
+              <a:srgbClr val="A51258"/>
+            </a:solidFill>
+            <a:tailEnd type="triangle"/>
+          </a:ln>
+          <a:effectLst>
+            <a:glow rad="50800">
+              <a:schemeClr val="tx1"/>
+            </a:glow>
+          </a:effectLst>
+        </p:spPr>
+        <p:style>
+          <a:lnRef idx="1">
+            <a:schemeClr val="accent1"/>
+          </a:lnRef>
+          <a:fillRef idx="0">
+            <a:schemeClr val="accent1"/>
+          </a:fillRef>
+          <a:effectRef idx="0">
+            <a:schemeClr val="accent1"/>
+          </a:effectRef>
+          <a:fontRef idx="minor">
+            <a:schemeClr val="tx1"/>
+          </a:fontRef>
+        </p:style>
+      </p:cxnSp>
+      <p:cxnSp>
+        <p:nvCxnSpPr>
+          <p:cNvPr id="50" name="Connecteur droit avec flèche 49">
+            <a:extLst>
+              <a:ext uri="{FF2B5EF4-FFF2-40B4-BE49-F238E27FC236}">
+                <a16:creationId xmlns:a16="http://schemas.microsoft.com/office/drawing/2014/main" id="{1912DCC9-2BF2-4A10-92A8-C4189365D209}"/>
+              </a:ext>
+            </a:extLst>
+          </p:cNvPr>
+          <p:cNvCxnSpPr>
+            <a:cxnSpLocks/>
+            <a:stCxn id="28" idx="2"/>
+            <a:endCxn id="39" idx="0"/>
+          </p:cNvCxnSpPr>
+          <p:nvPr/>
+        </p:nvCxnSpPr>
+        <p:spPr>
+          <a:xfrm>
+            <a:off x="1337472" y="4083363"/>
+            <a:ext cx="0" cy="923728"/>
+          </a:xfrm>
+          <a:prstGeom prst="straightConnector1">
+            <a:avLst/>
+          </a:prstGeom>
+          <a:ln w="38100">
+            <a:solidFill>
+              <a:srgbClr val="A51258"/>
+            </a:solidFill>
+            <a:tailEnd type="triangle"/>
+          </a:ln>
+          <a:effectLst>
+            <a:glow rad="50800">
+              <a:schemeClr val="tx1"/>
+            </a:glow>
+          </a:effectLst>
+        </p:spPr>
+        <p:style>
+          <a:lnRef idx="1">
+            <a:schemeClr val="accent1"/>
+          </a:lnRef>
+          <a:fillRef idx="0">
+            <a:schemeClr val="accent1"/>
+          </a:fillRef>
+          <a:effectRef idx="0">
+            <a:schemeClr val="accent1"/>
+          </a:effectRef>
+          <a:fontRef idx="minor">
+            <a:schemeClr val="tx1"/>
+          </a:fontRef>
+        </p:style>
+      </p:cxnSp>
     </p:spTree>
     <p:extLst>
       <p:ext uri="{BB962C8B-B14F-4D97-AF65-F5344CB8AC3E}">
-        <p14:creationId xmlns:p14="http://schemas.microsoft.com/office/powerpoint/2010/main" val="1377170629"/>
+        <p14:creationId xmlns:p14="http://schemas.microsoft.com/office/powerpoint/2010/main" val="3121079610"/>
       </p:ext>
     </p:extLst>
   </p:cSld>
@@ -13818,7 +15944,7 @@
         <p:spPr>
           <a:xfrm>
             <a:off x="2587752" y="143435"/>
-            <a:ext cx="6437376" cy="646331"/>
+            <a:ext cx="6437376" cy="1077218"/>
           </a:xfrm>
           <a:prstGeom prst="rect">
             <a:avLst/>
@@ -13833,7 +15959,7 @@
           <a:p>
             <a:pPr algn="ctr"/>
             <a:r>
-              <a:rPr lang="fr-FR" sz="3600" b="1" dirty="0">
+              <a:rPr lang="fr-FR" sz="3200" b="1" dirty="0">
                 <a:effectLst>
                   <a:outerShdw blurRad="38100" dist="38100" dir="2700000" algn="tl">
                     <a:srgbClr val="000000">
@@ -13846,7 +15972,7 @@
               <a:t>Langage de </a:t>
             </a:r>
             <a:r>
-              <a:rPr lang="fr-FR" sz="3600" b="1" dirty="0">
+              <a:rPr lang="fr-FR" sz="3200" b="1" dirty="0">
                 <a:solidFill>
                   <a:srgbClr val="A51258"/>
                 </a:solidFill>
@@ -13859,9 +15985,41 @@
                 </a:effectLst>
                 <a:latin typeface="Eras Medium ITC" panose="020B0602030504020804" pitchFamily="34" charset="0"/>
               </a:rPr>
-              <a:t>développement</a:t>
-            </a:r>
-            <a:endParaRPr lang="fr-FR" sz="2800" b="1" dirty="0">
+              <a:t>développement 2</a:t>
+            </a:r>
+            <a:r>
+              <a:rPr lang="fr-FR" sz="3200" b="1" baseline="30000" dirty="0">
+                <a:solidFill>
+                  <a:srgbClr val="A51258"/>
+                </a:solidFill>
+                <a:effectLst>
+                  <a:outerShdw blurRad="38100" dist="38100" dir="2700000" algn="tl">
+                    <a:srgbClr val="000000">
+                      <a:alpha val="43137"/>
+                    </a:srgbClr>
+                  </a:outerShdw>
+                </a:effectLst>
+                <a:latin typeface="Eras Medium ITC" panose="020B0602030504020804" pitchFamily="34" charset="0"/>
+              </a:rPr>
+              <a:t>ème </a:t>
+            </a:r>
+            <a:r>
+              <a:rPr lang="fr-FR" sz="3200" b="1" dirty="0">
+                <a:solidFill>
+                  <a:srgbClr val="A51258"/>
+                </a:solidFill>
+                <a:effectLst>
+                  <a:outerShdw blurRad="38100" dist="38100" dir="2700000" algn="tl">
+                    <a:srgbClr val="000000">
+                      <a:alpha val="43137"/>
+                    </a:srgbClr>
+                  </a:outerShdw>
+                </a:effectLst>
+                <a:latin typeface="Eras Medium ITC" panose="020B0602030504020804" pitchFamily="34" charset="0"/>
+              </a:rPr>
+              <a:t>environnement</a:t>
+            </a:r>
+            <a:endParaRPr lang="fr-FR" sz="2400" b="1" baseline="30000" dirty="0">
               <a:solidFill>
                 <a:srgbClr val="A51258"/>
               </a:solidFill>
@@ -14447,10 +16605,10 @@
       </p:sp>
       <p:sp>
         <p:nvSpPr>
-          <p:cNvPr id="3" name="Rectangle 2">
-            <a:extLst>
-              <a:ext uri="{FF2B5EF4-FFF2-40B4-BE49-F238E27FC236}">
-                <a16:creationId xmlns:a16="http://schemas.microsoft.com/office/drawing/2014/main" id="{D36F0F8B-9F16-4C37-87CF-5E71B402E9F6}"/>
+          <p:cNvPr id="31" name="Rectangle 30">
+            <a:extLst>
+              <a:ext uri="{FF2B5EF4-FFF2-40B4-BE49-F238E27FC236}">
+                <a16:creationId xmlns:a16="http://schemas.microsoft.com/office/drawing/2014/main" id="{B93A4B7B-3AC9-472B-ACDE-911F989E5A7C}"/>
               </a:ext>
             </a:extLst>
           </p:cNvPr>
@@ -14459,8 +16617,8 @@
         </p:nvSpPr>
         <p:spPr>
           <a:xfrm>
-            <a:off x="474543" y="1279161"/>
-            <a:ext cx="1938528" cy="833349"/>
+            <a:off x="615141" y="1614551"/>
+            <a:ext cx="1446370" cy="772543"/>
           </a:xfrm>
           <a:prstGeom prst="rect">
             <a:avLst/>
@@ -14499,7 +16657,7 @@
           <a:p>
             <a:pPr algn="ctr"/>
             <a:r>
-              <a:rPr lang="fr-FR" dirty="0">
+              <a:rPr lang="fr-FR" sz="1400" dirty="0">
                 <a:solidFill>
                   <a:schemeClr val="tx1"/>
                 </a:solidFill>
@@ -14507,66 +16665,36 @@
               <a:t>Développement sous </a:t>
             </a:r>
             <a:r>
-              <a:rPr lang="fr-FR" dirty="0">
+              <a:rPr lang="fr-FR" sz="1400" dirty="0">
                 <a:solidFill>
                   <a:srgbClr val="A51258"/>
                 </a:solidFill>
               </a:rPr>
-              <a:t>Raspbian</a:t>
-            </a:r>
-          </a:p>
-        </p:txBody>
-      </p:sp>
-      <p:pic>
-        <p:nvPicPr>
-          <p:cNvPr id="19" name="Image 18" descr="Une image contenant dessin&#10;&#10;Description générée automatiquement">
-            <a:extLst>
-              <a:ext uri="{FF2B5EF4-FFF2-40B4-BE49-F238E27FC236}">
-                <a16:creationId xmlns:a16="http://schemas.microsoft.com/office/drawing/2014/main" id="{9CD770EB-39C8-4961-A975-D81FE177F6E6}"/>
-              </a:ext>
-            </a:extLst>
-          </p:cNvPr>
-          <p:cNvPicPr>
-            <a:picLocks noChangeAspect="1"/>
-          </p:cNvPicPr>
-          <p:nvPr/>
-        </p:nvPicPr>
-        <p:blipFill>
-          <a:blip r:embed="rId3"/>
-          <a:stretch>
-            <a:fillRect/>
-          </a:stretch>
-        </p:blipFill>
-        <p:spPr>
-          <a:xfrm>
-            <a:off x="4573886" y="1050417"/>
-            <a:ext cx="2286622" cy="1290835"/>
-          </a:xfrm>
-          <a:prstGeom prst="rect">
-            <a:avLst/>
-          </a:prstGeom>
-        </p:spPr>
-      </p:pic>
+              <a:t>Windows 10</a:t>
+            </a:r>
+          </a:p>
+        </p:txBody>
+      </p:sp>
       <p:cxnSp>
         <p:nvCxnSpPr>
-          <p:cNvPr id="21" name="Connecteur droit avec flèche 20">
-            <a:extLst>
-              <a:ext uri="{FF2B5EF4-FFF2-40B4-BE49-F238E27FC236}">
-                <a16:creationId xmlns:a16="http://schemas.microsoft.com/office/drawing/2014/main" id="{B432392D-CDA4-4EF2-B283-182EA7C95F6D}"/>
+          <p:cNvPr id="33" name="Connecteur droit avec flèche 32">
+            <a:extLst>
+              <a:ext uri="{FF2B5EF4-FFF2-40B4-BE49-F238E27FC236}">
+                <a16:creationId xmlns:a16="http://schemas.microsoft.com/office/drawing/2014/main" id="{3AC45F99-3F4B-43F2-847E-0B1D7F6500B6}"/>
               </a:ext>
             </a:extLst>
           </p:cNvPr>
           <p:cNvCxnSpPr>
             <a:cxnSpLocks/>
-            <a:stCxn id="3" idx="3"/>
-            <a:endCxn id="19" idx="1"/>
+            <a:stCxn id="31" idx="3"/>
+            <a:endCxn id="22" idx="1"/>
           </p:cNvCxnSpPr>
           <p:nvPr/>
         </p:nvCxnSpPr>
         <p:spPr>
           <a:xfrm flipV="1">
-            <a:off x="2413071" y="1695835"/>
-            <a:ext cx="2160815" cy="1"/>
+            <a:off x="2061511" y="2000822"/>
+            <a:ext cx="1537093" cy="1"/>
           </a:xfrm>
           <a:prstGeom prst="straightConnector1">
             <a:avLst/>
@@ -14600,10 +16728,10 @@
       </p:cxnSp>
       <p:sp>
         <p:nvSpPr>
-          <p:cNvPr id="28" name="Rectangle 27">
-            <a:extLst>
-              <a:ext uri="{FF2B5EF4-FFF2-40B4-BE49-F238E27FC236}">
-                <a16:creationId xmlns:a16="http://schemas.microsoft.com/office/drawing/2014/main" id="{E25BD09E-F0C0-48E4-A20E-9726A94F44B7}"/>
+          <p:cNvPr id="34" name="Rectangle 33">
+            <a:extLst>
+              <a:ext uri="{FF2B5EF4-FFF2-40B4-BE49-F238E27FC236}">
+                <a16:creationId xmlns:a16="http://schemas.microsoft.com/office/drawing/2014/main" id="{ADD6DF09-2D06-4D7F-B0F1-90EBFEF53077}"/>
               </a:ext>
             </a:extLst>
           </p:cNvPr>
@@ -14612,8 +16740,8 @@
         </p:nvSpPr>
         <p:spPr>
           <a:xfrm>
-            <a:off x="474543" y="3143749"/>
-            <a:ext cx="1938528" cy="833349"/>
+            <a:off x="615141" y="3310821"/>
+            <a:ext cx="1444662" cy="772542"/>
           </a:xfrm>
           <a:prstGeom prst="rect">
             <a:avLst/>
@@ -14652,7 +16780,7 @@
           <a:p>
             <a:pPr algn="ctr"/>
             <a:r>
-              <a:rPr lang="fr-FR" dirty="0">
+              <a:rPr lang="fr-FR" sz="1400" dirty="0">
                 <a:solidFill>
                   <a:schemeClr val="tx1"/>
                 </a:solidFill>
@@ -14660,36 +16788,36 @@
               <a:t>En </a:t>
             </a:r>
             <a:r>
-              <a:rPr lang="fr-FR" dirty="0">
+              <a:rPr lang="fr-FR" sz="1400" dirty="0">
                 <a:solidFill>
                   <a:srgbClr val="A51258"/>
                 </a:solidFill>
               </a:rPr>
-              <a:t>Python</a:t>
+              <a:t>C#</a:t>
             </a:r>
           </a:p>
         </p:txBody>
       </p:sp>
       <p:cxnSp>
         <p:nvCxnSpPr>
-          <p:cNvPr id="29" name="Connecteur droit avec flèche 28">
-            <a:extLst>
-              <a:ext uri="{FF2B5EF4-FFF2-40B4-BE49-F238E27FC236}">
-                <a16:creationId xmlns:a16="http://schemas.microsoft.com/office/drawing/2014/main" id="{2E254BEC-E913-4433-AF37-9E11336C361F}"/>
+          <p:cNvPr id="35" name="Connecteur droit avec flèche 34">
+            <a:extLst>
+              <a:ext uri="{FF2B5EF4-FFF2-40B4-BE49-F238E27FC236}">
+                <a16:creationId xmlns:a16="http://schemas.microsoft.com/office/drawing/2014/main" id="{B6F52747-8EF2-40A0-A290-CE0CB2E386CA}"/>
               </a:ext>
             </a:extLst>
           </p:cNvPr>
           <p:cNvCxnSpPr>
             <a:cxnSpLocks/>
-            <a:stCxn id="28" idx="3"/>
-            <a:endCxn id="1024" idx="1"/>
+            <a:stCxn id="34" idx="3"/>
+            <a:endCxn id="48" idx="1"/>
           </p:cNvCxnSpPr>
           <p:nvPr/>
         </p:nvCxnSpPr>
         <p:spPr>
-          <a:xfrm flipV="1">
-            <a:off x="2413071" y="3560423"/>
-            <a:ext cx="2881674" cy="1"/>
+          <a:xfrm>
+            <a:off x="2059803" y="3697092"/>
+            <a:ext cx="2916578" cy="0"/>
           </a:xfrm>
           <a:prstGeom prst="straightConnector1">
             <a:avLst/>
@@ -14721,56 +16849,26 @@
           </a:fontRef>
         </p:style>
       </p:cxnSp>
-      <p:pic>
-        <p:nvPicPr>
-          <p:cNvPr id="1024" name="Image 1023">
-            <a:extLst>
-              <a:ext uri="{FF2B5EF4-FFF2-40B4-BE49-F238E27FC236}">
-                <a16:creationId xmlns:a16="http://schemas.microsoft.com/office/drawing/2014/main" id="{EBBE580E-AF9B-4527-BC42-179DD376C09A}"/>
-              </a:ext>
-            </a:extLst>
-          </p:cNvPr>
-          <p:cNvPicPr>
-            <a:picLocks noChangeAspect="1"/>
-          </p:cNvPicPr>
-          <p:nvPr/>
-        </p:nvPicPr>
-        <p:blipFill>
-          <a:blip r:embed="rId4"/>
-          <a:stretch>
-            <a:fillRect/>
-          </a:stretch>
-        </p:blipFill>
-        <p:spPr>
-          <a:xfrm>
-            <a:off x="5294745" y="2748420"/>
-            <a:ext cx="1551827" cy="1624005"/>
-          </a:xfrm>
-          <a:prstGeom prst="rect">
-            <a:avLst/>
-          </a:prstGeom>
-        </p:spPr>
-      </p:pic>
       <p:cxnSp>
         <p:nvCxnSpPr>
-          <p:cNvPr id="36" name="Connecteur droit avec flèche 35">
-            <a:extLst>
-              <a:ext uri="{FF2B5EF4-FFF2-40B4-BE49-F238E27FC236}">
-                <a16:creationId xmlns:a16="http://schemas.microsoft.com/office/drawing/2014/main" id="{33881EC8-C0C1-409C-9C50-5DC54E7D72F0}"/>
+          <p:cNvPr id="38" name="Connecteur droit avec flèche 37">
+            <a:extLst>
+              <a:ext uri="{FF2B5EF4-FFF2-40B4-BE49-F238E27FC236}">
+                <a16:creationId xmlns:a16="http://schemas.microsoft.com/office/drawing/2014/main" id="{4325F413-713C-4445-8CAC-E02EC8E183A3}"/>
               </a:ext>
             </a:extLst>
           </p:cNvPr>
           <p:cNvCxnSpPr>
             <a:cxnSpLocks/>
-            <a:stCxn id="3" idx="2"/>
-            <a:endCxn id="28" idx="0"/>
+            <a:stCxn id="31" idx="2"/>
+            <a:endCxn id="34" idx="0"/>
           </p:cNvCxnSpPr>
           <p:nvPr/>
         </p:nvCxnSpPr>
         <p:spPr>
-          <a:xfrm>
-            <a:off x="1443807" y="2112510"/>
-            <a:ext cx="0" cy="1031239"/>
+          <a:xfrm flipH="1">
+            <a:off x="1337472" y="2387094"/>
+            <a:ext cx="854" cy="923727"/>
           </a:xfrm>
           <a:prstGeom prst="straightConnector1">
             <a:avLst/>
@@ -14804,10 +16902,10 @@
       </p:cxnSp>
       <p:sp>
         <p:nvSpPr>
-          <p:cNvPr id="39" name="Rectangle 38">
-            <a:extLst>
-              <a:ext uri="{FF2B5EF4-FFF2-40B4-BE49-F238E27FC236}">
-                <a16:creationId xmlns:a16="http://schemas.microsoft.com/office/drawing/2014/main" id="{842B3967-D030-492C-9567-7E58D43E4099}"/>
+          <p:cNvPr id="40" name="Rectangle 39">
+            <a:extLst>
+              <a:ext uri="{FF2B5EF4-FFF2-40B4-BE49-F238E27FC236}">
+                <a16:creationId xmlns:a16="http://schemas.microsoft.com/office/drawing/2014/main" id="{3336D6EE-DAA3-4269-8743-4E572544F277}"/>
               </a:ext>
             </a:extLst>
           </p:cNvPr>
@@ -14816,8 +16914,8 @@
         </p:nvSpPr>
         <p:spPr>
           <a:xfrm>
-            <a:off x="474543" y="5008337"/>
-            <a:ext cx="1938528" cy="833349"/>
+            <a:off x="615141" y="5007091"/>
+            <a:ext cx="1444662" cy="772542"/>
           </a:xfrm>
           <a:prstGeom prst="rect">
             <a:avLst/>
@@ -14856,7 +16954,7 @@
           <a:p>
             <a:pPr algn="ctr"/>
             <a:r>
-              <a:rPr lang="fr-FR" dirty="0">
+              <a:rPr lang="fr-FR" sz="1400" dirty="0">
                 <a:solidFill>
                   <a:schemeClr val="tx1"/>
                 </a:solidFill>
@@ -14864,66 +16962,36 @@
               <a:t>Avec </a:t>
             </a:r>
             <a:r>
-              <a:rPr lang="fr-FR" dirty="0">
+              <a:rPr lang="fr-FR" sz="1400" dirty="0">
                 <a:solidFill>
                   <a:srgbClr val="A51258"/>
                 </a:solidFill>
               </a:rPr>
-              <a:t>Pycharm</a:t>
-            </a:r>
-          </a:p>
-        </p:txBody>
-      </p:sp>
-      <p:pic>
-        <p:nvPicPr>
-          <p:cNvPr id="1031" name="Image 1030" descr="Une image contenant dessin, signe&#10;&#10;Description générée automatiquement">
-            <a:extLst>
-              <a:ext uri="{FF2B5EF4-FFF2-40B4-BE49-F238E27FC236}">
-                <a16:creationId xmlns:a16="http://schemas.microsoft.com/office/drawing/2014/main" id="{7228FA1E-E3D5-496A-B23F-F12537FD9C4D}"/>
-              </a:ext>
-            </a:extLst>
-          </p:cNvPr>
-          <p:cNvPicPr>
-            <a:picLocks noChangeAspect="1"/>
-          </p:cNvPicPr>
-          <p:nvPr/>
-        </p:nvPicPr>
-        <p:blipFill>
-          <a:blip r:embed="rId5"/>
-          <a:stretch>
-            <a:fillRect/>
-          </a:stretch>
-        </p:blipFill>
-        <p:spPr>
-          <a:xfrm>
-            <a:off x="7029993" y="4675053"/>
-            <a:ext cx="1999889" cy="1499916"/>
-          </a:xfrm>
-          <a:prstGeom prst="rect">
-            <a:avLst/>
-          </a:prstGeom>
-        </p:spPr>
-      </p:pic>
+              <a:t>Visual Studio</a:t>
+            </a:r>
+          </a:p>
+        </p:txBody>
+      </p:sp>
       <p:cxnSp>
         <p:nvCxnSpPr>
-          <p:cNvPr id="45" name="Connecteur droit avec flèche 44">
-            <a:extLst>
-              <a:ext uri="{FF2B5EF4-FFF2-40B4-BE49-F238E27FC236}">
-                <a16:creationId xmlns:a16="http://schemas.microsoft.com/office/drawing/2014/main" id="{F4060EED-2CED-4349-9162-232E3292F492}"/>
+          <p:cNvPr id="42" name="Connecteur droit avec flèche 41">
+            <a:extLst>
+              <a:ext uri="{FF2B5EF4-FFF2-40B4-BE49-F238E27FC236}">
+                <a16:creationId xmlns:a16="http://schemas.microsoft.com/office/drawing/2014/main" id="{F64FEFD4-4B82-44C4-9F9C-3E0D6299D92F}"/>
               </a:ext>
             </a:extLst>
           </p:cNvPr>
           <p:cNvCxnSpPr>
             <a:cxnSpLocks/>
-            <a:stCxn id="39" idx="3"/>
-            <a:endCxn id="1031" idx="1"/>
+            <a:stCxn id="40" idx="3"/>
+            <a:endCxn id="58" idx="1"/>
           </p:cNvCxnSpPr>
           <p:nvPr/>
         </p:nvCxnSpPr>
         <p:spPr>
-          <a:xfrm flipV="1">
-            <a:off x="2413071" y="5425011"/>
-            <a:ext cx="4616922" cy="1"/>
+          <a:xfrm>
+            <a:off x="2059803" y="5393362"/>
+            <a:ext cx="4581520" cy="0"/>
           </a:xfrm>
           <a:prstGeom prst="straightConnector1">
             <a:avLst/>
@@ -14957,22 +17025,24 @@
       </p:cxnSp>
       <p:cxnSp>
         <p:nvCxnSpPr>
-          <p:cNvPr id="50" name="Connecteur droit avec flèche 49">
-            <a:extLst>
-              <a:ext uri="{FF2B5EF4-FFF2-40B4-BE49-F238E27FC236}">
-                <a16:creationId xmlns:a16="http://schemas.microsoft.com/office/drawing/2014/main" id="{1912DCC9-2BF2-4A10-92A8-C4189365D209}"/>
+          <p:cNvPr id="43" name="Connecteur droit avec flèche 42">
+            <a:extLst>
+              <a:ext uri="{FF2B5EF4-FFF2-40B4-BE49-F238E27FC236}">
+                <a16:creationId xmlns:a16="http://schemas.microsoft.com/office/drawing/2014/main" id="{D6C84D48-16C6-4FD7-BE2C-1C07A98FDEF6}"/>
               </a:ext>
             </a:extLst>
           </p:cNvPr>
           <p:cNvCxnSpPr>
             <a:cxnSpLocks/>
+            <a:stCxn id="34" idx="2"/>
+            <a:endCxn id="40" idx="0"/>
           </p:cNvCxnSpPr>
           <p:nvPr/>
         </p:nvCxnSpPr>
         <p:spPr>
           <a:xfrm>
-            <a:off x="1458864" y="3977098"/>
-            <a:ext cx="0" cy="1031239"/>
+            <a:off x="1337472" y="4083363"/>
+            <a:ext cx="0" cy="923728"/>
           </a:xfrm>
           <a:prstGeom prst="straightConnector1">
             <a:avLst/>
@@ -15004,10 +17074,98 @@
           </a:fontRef>
         </p:style>
       </p:cxnSp>
+      <p:pic>
+        <p:nvPicPr>
+          <p:cNvPr id="22" name="Image 21" descr="Une image contenant signe, dessin&#10;&#10;Description générée automatiquement">
+            <a:extLst>
+              <a:ext uri="{FF2B5EF4-FFF2-40B4-BE49-F238E27FC236}">
+                <a16:creationId xmlns:a16="http://schemas.microsoft.com/office/drawing/2014/main" id="{6BC78B62-3682-468C-8D67-C407A7A84B28}"/>
+              </a:ext>
+            </a:extLst>
+          </p:cNvPr>
+          <p:cNvPicPr>
+            <a:picLocks noChangeAspect="1"/>
+          </p:cNvPicPr>
+          <p:nvPr/>
+        </p:nvPicPr>
+        <p:blipFill rotWithShape="1">
+          <a:blip r:embed="rId3"/>
+          <a:srcRect l="-18" t="28765" r="18" b="32329"/>
+          <a:stretch/>
+        </p:blipFill>
+        <p:spPr>
+          <a:xfrm>
+            <a:off x="3598604" y="1726785"/>
+            <a:ext cx="2756146" cy="548074"/>
+          </a:xfrm>
+          <a:prstGeom prst="rect">
+            <a:avLst/>
+          </a:prstGeom>
+        </p:spPr>
+      </p:pic>
+      <p:pic>
+        <p:nvPicPr>
+          <p:cNvPr id="48" name="Image 47">
+            <a:extLst>
+              <a:ext uri="{FF2B5EF4-FFF2-40B4-BE49-F238E27FC236}">
+                <a16:creationId xmlns:a16="http://schemas.microsoft.com/office/drawing/2014/main" id="{A803A2CC-8ADC-4CEC-9AEB-000504BB6D72}"/>
+              </a:ext>
+            </a:extLst>
+          </p:cNvPr>
+          <p:cNvPicPr>
+            <a:picLocks noChangeAspect="1"/>
+          </p:cNvPicPr>
+          <p:nvPr/>
+        </p:nvPicPr>
+        <p:blipFill rotWithShape="1">
+          <a:blip r:embed="rId4"/>
+          <a:srcRect l="3151" r="4944" b="3777"/>
+          <a:stretch/>
+        </p:blipFill>
+        <p:spPr>
+          <a:xfrm>
+            <a:off x="4976381" y="2976179"/>
+            <a:ext cx="1377121" cy="1441826"/>
+          </a:xfrm>
+          <a:prstGeom prst="rect">
+            <a:avLst/>
+          </a:prstGeom>
+        </p:spPr>
+      </p:pic>
+      <p:pic>
+        <p:nvPicPr>
+          <p:cNvPr id="58" name="Image 57" descr="Une image contenant signe, horloge, dessin&#10;&#10;Description générée automatiquement">
+            <a:extLst>
+              <a:ext uri="{FF2B5EF4-FFF2-40B4-BE49-F238E27FC236}">
+                <a16:creationId xmlns:a16="http://schemas.microsoft.com/office/drawing/2014/main" id="{B3798491-485E-4117-A472-0CA5D1B71C12}"/>
+              </a:ext>
+            </a:extLst>
+          </p:cNvPr>
+          <p:cNvPicPr>
+            <a:picLocks noChangeAspect="1"/>
+          </p:cNvPicPr>
+          <p:nvPr/>
+        </p:nvPicPr>
+        <p:blipFill>
+          <a:blip r:embed="rId5"/>
+          <a:stretch>
+            <a:fillRect/>
+          </a:stretch>
+        </p:blipFill>
+        <p:spPr>
+          <a:xfrm>
+            <a:off x="6641323" y="4525848"/>
+            <a:ext cx="1726396" cy="1735028"/>
+          </a:xfrm>
+          <a:prstGeom prst="rect">
+            <a:avLst/>
+          </a:prstGeom>
+        </p:spPr>
+      </p:pic>
     </p:spTree>
     <p:extLst>
       <p:ext uri="{BB962C8B-B14F-4D97-AF65-F5344CB8AC3E}">
-        <p14:creationId xmlns:p14="http://schemas.microsoft.com/office/powerpoint/2010/main" val="3121079610"/>
+        <p14:creationId xmlns:p14="http://schemas.microsoft.com/office/powerpoint/2010/main" val="3356514047"/>
       </p:ext>
     </p:extLst>
   </p:cSld>
@@ -15105,8 +17263,8 @@
         </p:nvSpPr>
         <p:spPr>
           <a:xfrm>
-            <a:off x="-301752" y="2554862"/>
-            <a:ext cx="3758184" cy="646331"/>
+            <a:off x="2587752" y="143435"/>
+            <a:ext cx="6437376" cy="646331"/>
           </a:xfrm>
           <a:prstGeom prst="rect">
             <a:avLst/>
@@ -15121,23 +17279,7 @@
           <a:p>
             <a:pPr algn="ctr"/>
             <a:r>
-              <a:rPr lang="fr-FR" sz="2000" b="1" dirty="0">
-                <a:effectLst>
-                  <a:outerShdw blurRad="38100" dist="38100" dir="2700000" algn="tl">
-                    <a:srgbClr val="000000">
-                      <a:alpha val="43137"/>
-                    </a:srgbClr>
-                  </a:outerShdw>
-                </a:effectLst>
-                <a:latin typeface="Eras Medium ITC" panose="020B0602030504020804" pitchFamily="34" charset="0"/>
-              </a:rPr>
-              <a:t>Diagramme de séquence :</a:t>
-            </a:r>
-          </a:p>
-          <a:p>
-            <a:pPr algn="ctr"/>
-            <a:r>
-              <a:rPr lang="fr-FR" sz="1600" b="1" dirty="0">
+              <a:rPr lang="fr-FR" sz="3600" b="1" dirty="0">
                 <a:solidFill>
                   <a:srgbClr val="A51258"/>
                 </a:solidFill>
@@ -15150,40 +17292,21 @@
                 </a:effectLst>
                 <a:latin typeface="Eras Medium ITC" panose="020B0602030504020804" pitchFamily="34" charset="0"/>
               </a:rPr>
-              <a:t>Système sous </a:t>
-            </a:r>
-            <a:r>
-              <a:rPr lang="fr-FR" sz="1600" b="1" dirty="0" err="1">
-                <a:solidFill>
-                  <a:srgbClr val="A51258"/>
-                </a:solidFill>
-                <a:effectLst>
-                  <a:outerShdw blurRad="38100" dist="38100" dir="2700000" algn="tl">
-                    <a:srgbClr val="000000">
-                      <a:alpha val="43137"/>
-                    </a:srgbClr>
-                  </a:outerShdw>
-                </a:effectLst>
-                <a:latin typeface="Eras Medium ITC" panose="020B0602030504020804" pitchFamily="34" charset="0"/>
-              </a:rPr>
-              <a:t>raspberry</a:t>
-            </a:r>
-            <a:r>
-              <a:rPr lang="fr-FR" sz="1600" b="1" dirty="0">
-                <a:solidFill>
-                  <a:srgbClr val="A51258"/>
-                </a:solidFill>
-                <a:effectLst>
-                  <a:outerShdw blurRad="38100" dist="38100" dir="2700000" algn="tl">
-                    <a:srgbClr val="000000">
-                      <a:alpha val="43137"/>
-                    </a:srgbClr>
-                  </a:outerShdw>
-                </a:effectLst>
-                <a:latin typeface="Eras Medium ITC" panose="020B0602030504020804" pitchFamily="34" charset="0"/>
-              </a:rPr>
-              <a:t>, partie 1 </a:t>
-            </a:r>
+              <a:t>Câblage</a:t>
+            </a:r>
+            <a:endParaRPr lang="fr-FR" sz="2800" b="1" dirty="0">
+              <a:solidFill>
+                <a:srgbClr val="A51258"/>
+              </a:solidFill>
+              <a:effectLst>
+                <a:outerShdw blurRad="38100" dist="38100" dir="2700000" algn="tl">
+                  <a:srgbClr val="000000">
+                    <a:alpha val="43137"/>
+                  </a:srgbClr>
+                </a:outerShdw>
+              </a:effectLst>
+              <a:latin typeface="Eras Medium ITC" panose="020B0602030504020804" pitchFamily="34" charset="0"/>
+            </a:endParaRPr>
           </a:p>
         </p:txBody>
       </p:sp>
@@ -15757,10 +17880,10 @@
       </p:sp>
       <p:pic>
         <p:nvPicPr>
-          <p:cNvPr id="4" name="Image 3">
-            <a:extLst>
-              <a:ext uri="{FF2B5EF4-FFF2-40B4-BE49-F238E27FC236}">
-                <a16:creationId xmlns:a16="http://schemas.microsoft.com/office/drawing/2014/main" id="{F6F50CF8-8F97-49CE-8AC9-109901FFB29C}"/>
+          <p:cNvPr id="20" name="Image 19" descr="Une image contenant ordinateur&#10;&#10;Description générée automatiquement">
+            <a:extLst>
+              <a:ext uri="{FF2B5EF4-FFF2-40B4-BE49-F238E27FC236}">
+                <a16:creationId xmlns:a16="http://schemas.microsoft.com/office/drawing/2014/main" id="{2CECDA03-D18F-459D-A3E6-1C306067CAC0}"/>
               </a:ext>
             </a:extLst>
           </p:cNvPr>
@@ -15769,15 +17892,16 @@
           </p:cNvPicPr>
           <p:nvPr/>
         </p:nvPicPr>
-        <p:blipFill rotWithShape="1">
+        <p:blipFill>
           <a:blip r:embed="rId3"/>
-          <a:srcRect r="35426" b="36133"/>
-          <a:stretch/>
+          <a:stretch>
+            <a:fillRect/>
+          </a:stretch>
         </p:blipFill>
         <p:spPr>
           <a:xfrm>
-            <a:off x="3513019" y="0"/>
-            <a:ext cx="5223127" cy="6858000"/>
+            <a:off x="1729603" y="859862"/>
+            <a:ext cx="6717629" cy="5998138"/>
           </a:xfrm>
           <a:prstGeom prst="rect">
             <a:avLst/>
@@ -15787,7 +17911,7 @@
     </p:spTree>
     <p:extLst>
       <p:ext uri="{BB962C8B-B14F-4D97-AF65-F5344CB8AC3E}">
-        <p14:creationId xmlns:p14="http://schemas.microsoft.com/office/powerpoint/2010/main" val="1939906211"/>
+        <p14:creationId xmlns:p14="http://schemas.microsoft.com/office/powerpoint/2010/main" val="3484094220"/>
       </p:ext>
     </p:extLst>
   </p:cSld>
@@ -15885,8 +18009,8 @@
         </p:nvSpPr>
         <p:spPr>
           <a:xfrm>
-            <a:off x="3704463" y="309052"/>
-            <a:ext cx="3758184" cy="646331"/>
+            <a:off x="2587752" y="143435"/>
+            <a:ext cx="6437376" cy="646331"/>
           </a:xfrm>
           <a:prstGeom prst="rect">
             <a:avLst/>
@@ -15901,7 +18025,7 @@
           <a:p>
             <a:pPr algn="ctr"/>
             <a:r>
-              <a:rPr lang="fr-FR" sz="2000" b="1" dirty="0">
+              <a:rPr lang="fr-FR" sz="3600" b="1" dirty="0">
                 <a:effectLst>
                   <a:outerShdw blurRad="38100" dist="38100" dir="2700000" algn="tl">
                     <a:srgbClr val="000000">
@@ -15911,15 +18035,12 @@
                 </a:effectLst>
                 <a:latin typeface="Eras Medium ITC" panose="020B0602030504020804" pitchFamily="34" charset="0"/>
               </a:rPr>
-              <a:t>Diagramme de séquence :</a:t>
-            </a:r>
-          </a:p>
-          <a:p>
-            <a:pPr algn="ctr"/>
-            <a:r>
-              <a:rPr lang="fr-FR" sz="1600" b="1" dirty="0">
+              <a:t>Diagramme de cas </a:t>
+            </a:r>
+            <a:r>
+              <a:rPr lang="fr-FR" sz="3600" b="1" dirty="0">
                 <a:solidFill>
-                  <a:srgbClr val="A51258"/>
+                  <a:srgbClr val="A31257"/>
                 </a:solidFill>
                 <a:effectLst>
                   <a:outerShdw blurRad="38100" dist="38100" dir="2700000" algn="tl">
@@ -15930,13 +18051,10 @@
                 </a:effectLst>
                 <a:latin typeface="Eras Medium ITC" panose="020B0602030504020804" pitchFamily="34" charset="0"/>
               </a:rPr>
-              <a:t>Système sous </a:t>
-            </a:r>
-            <a:r>
-              <a:rPr lang="fr-FR" sz="1600" b="1" dirty="0" err="1">
-                <a:solidFill>
-                  <a:srgbClr val="A51258"/>
-                </a:solidFill>
+              <a:t>d’utilisation</a:t>
+            </a:r>
+            <a:r>
+              <a:rPr lang="fr-FR" sz="3600" b="1" dirty="0">
                 <a:effectLst>
                   <a:outerShdw blurRad="38100" dist="38100" dir="2700000" algn="tl">
                     <a:srgbClr val="000000">
@@ -15946,27 +18064,40 @@
                 </a:effectLst>
                 <a:latin typeface="Eras Medium ITC" panose="020B0602030504020804" pitchFamily="34" charset="0"/>
               </a:rPr>
-              <a:t>raspberry</a:t>
-            </a:r>
-            <a:r>
-              <a:rPr lang="fr-FR" sz="1600" b="1" dirty="0">
-                <a:solidFill>
-                  <a:srgbClr val="A51258"/>
-                </a:solidFill>
-                <a:effectLst>
-                  <a:outerShdw blurRad="38100" dist="38100" dir="2700000" algn="tl">
-                    <a:srgbClr val="000000">
-                      <a:alpha val="43137"/>
-                    </a:srgbClr>
-                  </a:outerShdw>
-                </a:effectLst>
-                <a:latin typeface="Eras Medium ITC" panose="020B0602030504020804" pitchFamily="34" charset="0"/>
-              </a:rPr>
-              <a:t>, partie 2 </a:t>
-            </a:r>
-          </a:p>
-        </p:txBody>
-      </p:sp>
+              <a:t>  </a:t>
+            </a:r>
+          </a:p>
+        </p:txBody>
+      </p:sp>
+      <p:pic>
+        <p:nvPicPr>
+          <p:cNvPr id="5" name="Image 4" descr="Une image contenant texte, carte, capture d’écran&#10;&#10;Description générée automatiquement">
+            <a:extLst>
+              <a:ext uri="{FF2B5EF4-FFF2-40B4-BE49-F238E27FC236}">
+                <a16:creationId xmlns:a16="http://schemas.microsoft.com/office/drawing/2014/main" id="{F3CC10DC-37D4-43BE-BB94-2AA6BA44EF0A}"/>
+              </a:ext>
+            </a:extLst>
+          </p:cNvPr>
+          <p:cNvPicPr>
+            <a:picLocks noChangeAspect="1"/>
+          </p:cNvPicPr>
+          <p:nvPr/>
+        </p:nvPicPr>
+        <p:blipFill rotWithShape="1">
+          <a:blip r:embed="rId3"/>
+          <a:srcRect l="1206" t="3761" r="2523" b="2393"/>
+          <a:stretch/>
+        </p:blipFill>
+        <p:spPr>
+          <a:xfrm>
+            <a:off x="2796424" y="1022694"/>
+            <a:ext cx="4798345" cy="5405538"/>
+          </a:xfrm>
+          <a:prstGeom prst="rect">
+            <a:avLst/>
+          </a:prstGeom>
+        </p:spPr>
+      </p:pic>
       <p:sp>
         <p:nvSpPr>
           <p:cNvPr id="6" name="Organigramme : Terminateur 5">
@@ -16535,39 +18666,10 @@
           </a:p>
         </p:txBody>
       </p:sp>
-      <p:pic>
-        <p:nvPicPr>
-          <p:cNvPr id="4" name="Image 3">
-            <a:extLst>
-              <a:ext uri="{FF2B5EF4-FFF2-40B4-BE49-F238E27FC236}">
-                <a16:creationId xmlns:a16="http://schemas.microsoft.com/office/drawing/2014/main" id="{F6F50CF8-8F97-49CE-8AC9-109901FFB29C}"/>
-              </a:ext>
-            </a:extLst>
-          </p:cNvPr>
-          <p:cNvPicPr>
-            <a:picLocks noChangeAspect="1"/>
-          </p:cNvPicPr>
-          <p:nvPr/>
-        </p:nvPicPr>
-        <p:blipFill rotWithShape="1">
-          <a:blip r:embed="rId3"/>
-          <a:srcRect t="63122" r="7042" b="1467"/>
-          <a:stretch/>
-        </p:blipFill>
-        <p:spPr>
-          <a:xfrm>
-            <a:off x="751403" y="1600200"/>
-            <a:ext cx="8968354" cy="4535424"/>
-          </a:xfrm>
-          <a:prstGeom prst="rect">
-            <a:avLst/>
-          </a:prstGeom>
-        </p:spPr>
-      </p:pic>
     </p:spTree>
     <p:extLst>
       <p:ext uri="{BB962C8B-B14F-4D97-AF65-F5344CB8AC3E}">
-        <p14:creationId xmlns:p14="http://schemas.microsoft.com/office/powerpoint/2010/main" val="673851662"/>
+        <p14:creationId xmlns:p14="http://schemas.microsoft.com/office/powerpoint/2010/main" val="1377170629"/>
       </p:ext>
     </p:extLst>
   </p:cSld>

</xml_diff>

<commit_message>
Maj gantt + Maj diapo revue 2
</commit_message>
<xml_diff>
--- a/Guillaume/Documents/Revue 2 de projet étudiant 1 Escape Game Téléthon.pptx
+++ b/Guillaume/Documents/Revue 2 de projet étudiant 1 Escape Game Téléthon.pptx
@@ -17,6 +17,8 @@
     <p:sldId id="265" r:id="rId11"/>
     <p:sldId id="268" r:id="rId12"/>
     <p:sldId id="266" r:id="rId13"/>
+    <p:sldId id="271" r:id="rId14"/>
+    <p:sldId id="272" r:id="rId15"/>
   </p:sldIdLst>
   <p:sldSz cx="12192000" cy="6858000"/>
   <p:notesSz cx="6858000" cy="9144000"/>
@@ -10357,6 +10359,456 @@
 </p:sld>
 </file>
 
+<file path=ppt/slides/slide13.xml><?xml version="1.0" encoding="utf-8"?>
+<p:sld xmlns:a="http://schemas.openxmlformats.org/drawingml/2006/main" xmlns:r="http://schemas.openxmlformats.org/officeDocument/2006/relationships" xmlns:p="http://schemas.openxmlformats.org/presentationml/2006/main">
+  <p:cSld>
+    <p:spTree>
+      <p:nvGrpSpPr>
+        <p:cNvPr id="1" name=""/>
+        <p:cNvGrpSpPr/>
+        <p:nvPr/>
+      </p:nvGrpSpPr>
+      <p:grpSpPr>
+        <a:xfrm>
+          <a:off x="0" y="0"/>
+          <a:ext cx="0" cy="0"/>
+          <a:chOff x="0" y="0"/>
+          <a:chExt cx="0" cy="0"/>
+        </a:xfrm>
+      </p:grpSpPr>
+      <p:pic>
+        <p:nvPicPr>
+          <p:cNvPr id="1026" name="Picture 2" descr="Image associée">
+            <a:extLst>
+              <a:ext uri="{FF2B5EF4-FFF2-40B4-BE49-F238E27FC236}">
+                <a16:creationId xmlns:a16="http://schemas.microsoft.com/office/drawing/2014/main" id="{C816F3D8-CC4C-46B3-A21E-58AE9AD30454}"/>
+              </a:ext>
+            </a:extLst>
+          </p:cNvPr>
+          <p:cNvPicPr>
+            <a:picLocks noChangeAspect="1" noChangeArrowheads="1"/>
+          </p:cNvPicPr>
+          <p:nvPr/>
+        </p:nvPicPr>
+        <p:blipFill rotWithShape="1">
+          <a:blip r:embed="rId2">
+            <a:extLst>
+              <a:ext uri="{28A0092B-C50C-407E-A947-70E740481C1C}">
+                <a14:useLocalDpi xmlns:a14="http://schemas.microsoft.com/office/drawing/2010/main" val="0"/>
+              </a:ext>
+            </a:extLst>
+          </a:blip>
+          <a:srcRect l="18677" r="15441"/>
+          <a:stretch/>
+        </p:blipFill>
+        <p:spPr bwMode="auto">
+          <a:xfrm>
+            <a:off x="143436" y="143435"/>
+            <a:ext cx="2269635" cy="609600"/>
+          </a:xfrm>
+          <a:prstGeom prst="rect">
+            <a:avLst/>
+          </a:prstGeom>
+          <a:noFill/>
+          <a:extLst>
+            <a:ext uri="{909E8E84-426E-40DD-AFC4-6F175D3DCCD1}">
+              <a14:hiddenFill xmlns:a14="http://schemas.microsoft.com/office/drawing/2010/main">
+                <a:solidFill>
+                  <a:srgbClr val="FFFFFF"/>
+                </a:solidFill>
+              </a14:hiddenFill>
+            </a:ext>
+          </a:extLst>
+        </p:spPr>
+      </p:pic>
+      <p:sp>
+        <p:nvSpPr>
+          <p:cNvPr id="3" name="ZoneTexte 2">
+            <a:extLst>
+              <a:ext uri="{FF2B5EF4-FFF2-40B4-BE49-F238E27FC236}">
+                <a16:creationId xmlns:a16="http://schemas.microsoft.com/office/drawing/2014/main" id="{1582123C-25BF-42F1-97F8-35FFB48DFFAA}"/>
+              </a:ext>
+            </a:extLst>
+          </p:cNvPr>
+          <p:cNvSpPr txBox="1"/>
+          <p:nvPr/>
+        </p:nvSpPr>
+        <p:spPr>
+          <a:xfrm>
+            <a:off x="2497873" y="143435"/>
+            <a:ext cx="6188927" cy="1138773"/>
+          </a:xfrm>
+          <a:prstGeom prst="rect">
+            <a:avLst/>
+          </a:prstGeom>
+          <a:noFill/>
+          <a:ln>
+            <a:noFill/>
+          </a:ln>
+          <a:effectLst>
+            <a:glow rad="63500">
+              <a:schemeClr val="accent4">
+                <a:satMod val="175000"/>
+                <a:alpha val="40000"/>
+              </a:schemeClr>
+            </a:glow>
+            <a:outerShdw blurRad="50800" dist="38100" dir="5400000" algn="t" rotWithShape="0">
+              <a:prstClr val="black">
+                <a:alpha val="40000"/>
+              </a:prstClr>
+            </a:outerShdw>
+          </a:effectLst>
+          <a:scene3d>
+            <a:camera prst="orthographicFront">
+              <a:rot lat="0" lon="0" rev="0"/>
+            </a:camera>
+            <a:lightRig rig="soft" dir="t">
+              <a:rot lat="0" lon="0" rev="0"/>
+            </a:lightRig>
+          </a:scene3d>
+          <a:sp3d contourW="44450" prstMaterial="matte">
+            <a:bevelT w="63500" h="63500" prst="artDeco"/>
+            <a:contourClr>
+              <a:srgbClr val="FFFFFF"/>
+            </a:contourClr>
+          </a:sp3d>
+        </p:spPr>
+        <p:txBody>
+          <a:bodyPr wrap="square" rtlCol="0">
+            <a:spAutoFit/>
+          </a:bodyPr>
+          <a:lstStyle/>
+          <a:p>
+            <a:pPr algn="ctr"/>
+            <a:r>
+              <a:rPr lang="fr-FR" sz="3600" b="1" dirty="0">
+                <a:latin typeface="Eras Medium ITC" panose="020B0602030504020804" pitchFamily="34" charset="0"/>
+              </a:rPr>
+              <a:t>Planification Gantt           </a:t>
+            </a:r>
+            <a:r>
+              <a:rPr lang="fr-FR" sz="3200" b="1" dirty="0">
+                <a:solidFill>
+                  <a:srgbClr val="A41258"/>
+                </a:solidFill>
+                <a:latin typeface="Eras Medium ITC" panose="020B0602030504020804" pitchFamily="34" charset="0"/>
+              </a:rPr>
+              <a:t>Partie commune </a:t>
+            </a:r>
+            <a:r>
+              <a:rPr lang="fr-FR" sz="3200" b="1" dirty="0">
+                <a:latin typeface="Eras Medium ITC" panose="020B0602030504020804" pitchFamily="34" charset="0"/>
+              </a:rPr>
+              <a:t>:</a:t>
+            </a:r>
+          </a:p>
+        </p:txBody>
+      </p:sp>
+      <p:pic>
+        <p:nvPicPr>
+          <p:cNvPr id="6" name="Image 5" descr="Une image contenant capture d’écran&#10;&#10;Description générée automatiquement">
+            <a:extLst>
+              <a:ext uri="{FF2B5EF4-FFF2-40B4-BE49-F238E27FC236}">
+                <a16:creationId xmlns:a16="http://schemas.microsoft.com/office/drawing/2014/main" id="{612B15C4-79FA-4966-8D88-BD60FB5BE23E}"/>
+              </a:ext>
+            </a:extLst>
+          </p:cNvPr>
+          <p:cNvPicPr>
+            <a:picLocks noChangeAspect="1"/>
+          </p:cNvPicPr>
+          <p:nvPr/>
+        </p:nvPicPr>
+        <p:blipFill>
+          <a:blip r:embed="rId3"/>
+          <a:stretch>
+            <a:fillRect/>
+          </a:stretch>
+        </p:blipFill>
+        <p:spPr>
+          <a:xfrm>
+            <a:off x="0" y="4248029"/>
+            <a:ext cx="10426390" cy="2013259"/>
+          </a:xfrm>
+          <a:prstGeom prst="rect">
+            <a:avLst/>
+          </a:prstGeom>
+          <a:ln>
+            <a:noFill/>
+          </a:ln>
+          <a:effectLst>
+            <a:outerShdw blurRad="292100" dist="139700" dir="2700000" algn="tl" rotWithShape="0">
+              <a:srgbClr val="333333">
+                <a:alpha val="65000"/>
+              </a:srgbClr>
+            </a:outerShdw>
+          </a:effectLst>
+        </p:spPr>
+      </p:pic>
+      <p:pic>
+        <p:nvPicPr>
+          <p:cNvPr id="9" name="Image 8" descr="Une image contenant capture d’écran, ordinateur&#10;&#10;Description générée automatiquement">
+            <a:extLst>
+              <a:ext uri="{FF2B5EF4-FFF2-40B4-BE49-F238E27FC236}">
+                <a16:creationId xmlns:a16="http://schemas.microsoft.com/office/drawing/2014/main" id="{FA1C4999-4C72-456A-BFF1-A458813D70F4}"/>
+              </a:ext>
+            </a:extLst>
+          </p:cNvPr>
+          <p:cNvPicPr>
+            <a:picLocks noChangeAspect="1"/>
+          </p:cNvPicPr>
+          <p:nvPr/>
+        </p:nvPicPr>
+        <p:blipFill>
+          <a:blip r:embed="rId4"/>
+          <a:stretch>
+            <a:fillRect/>
+          </a:stretch>
+        </p:blipFill>
+        <p:spPr>
+          <a:xfrm>
+            <a:off x="0" y="1442053"/>
+            <a:ext cx="10426390" cy="2335835"/>
+          </a:xfrm>
+          <a:prstGeom prst="rect">
+            <a:avLst/>
+          </a:prstGeom>
+          <a:ln>
+            <a:noFill/>
+          </a:ln>
+          <a:effectLst>
+            <a:outerShdw blurRad="292100" dist="139700" dir="2700000" algn="tl" rotWithShape="0">
+              <a:srgbClr val="333333">
+                <a:alpha val="65000"/>
+              </a:srgbClr>
+            </a:outerShdw>
+          </a:effectLst>
+        </p:spPr>
+      </p:pic>
+    </p:spTree>
+    <p:extLst>
+      <p:ext uri="{BB962C8B-B14F-4D97-AF65-F5344CB8AC3E}">
+        <p14:creationId xmlns:p14="http://schemas.microsoft.com/office/powerpoint/2010/main" val="779748466"/>
+      </p:ext>
+    </p:extLst>
+  </p:cSld>
+  <p:clrMapOvr>
+    <a:masterClrMapping/>
+  </p:clrMapOvr>
+  <mc:AlternateContent xmlns:mc="http://schemas.openxmlformats.org/markup-compatibility/2006" xmlns:p159="http://schemas.microsoft.com/office/powerpoint/2015/09/main">
+    <mc:Choice Requires="p159">
+      <p:transition xmlns:p14="http://schemas.microsoft.com/office/powerpoint/2010/main" spd="slow" p14:dur="2000">
+        <p159:morph option="byObject"/>
+      </p:transition>
+    </mc:Choice>
+    <mc:Fallback xmlns="">
+      <p:transition spd="slow">
+        <p:fade/>
+      </p:transition>
+    </mc:Fallback>
+  </mc:AlternateContent>
+</p:sld>
+</file>
+
+<file path=ppt/slides/slide14.xml><?xml version="1.0" encoding="utf-8"?>
+<p:sld xmlns:a="http://schemas.openxmlformats.org/drawingml/2006/main" xmlns:r="http://schemas.openxmlformats.org/officeDocument/2006/relationships" xmlns:p="http://schemas.openxmlformats.org/presentationml/2006/main">
+  <p:cSld>
+    <p:spTree>
+      <p:nvGrpSpPr>
+        <p:cNvPr id="1" name=""/>
+        <p:cNvGrpSpPr/>
+        <p:nvPr/>
+      </p:nvGrpSpPr>
+      <p:grpSpPr>
+        <a:xfrm>
+          <a:off x="0" y="0"/>
+          <a:ext cx="0" cy="0"/>
+          <a:chOff x="0" y="0"/>
+          <a:chExt cx="0" cy="0"/>
+        </a:xfrm>
+      </p:grpSpPr>
+      <p:pic>
+        <p:nvPicPr>
+          <p:cNvPr id="1026" name="Picture 2" descr="Image associée">
+            <a:extLst>
+              <a:ext uri="{FF2B5EF4-FFF2-40B4-BE49-F238E27FC236}">
+                <a16:creationId xmlns:a16="http://schemas.microsoft.com/office/drawing/2014/main" id="{C816F3D8-CC4C-46B3-A21E-58AE9AD30454}"/>
+              </a:ext>
+            </a:extLst>
+          </p:cNvPr>
+          <p:cNvPicPr>
+            <a:picLocks noChangeAspect="1" noChangeArrowheads="1"/>
+          </p:cNvPicPr>
+          <p:nvPr/>
+        </p:nvPicPr>
+        <p:blipFill rotWithShape="1">
+          <a:blip r:embed="rId2">
+            <a:extLst>
+              <a:ext uri="{28A0092B-C50C-407E-A947-70E740481C1C}">
+                <a14:useLocalDpi xmlns:a14="http://schemas.microsoft.com/office/drawing/2010/main" val="0"/>
+              </a:ext>
+            </a:extLst>
+          </a:blip>
+          <a:srcRect l="18677" r="15441"/>
+          <a:stretch/>
+        </p:blipFill>
+        <p:spPr bwMode="auto">
+          <a:xfrm>
+            <a:off x="143436" y="143435"/>
+            <a:ext cx="2269635" cy="609600"/>
+          </a:xfrm>
+          <a:prstGeom prst="rect">
+            <a:avLst/>
+          </a:prstGeom>
+          <a:noFill/>
+          <a:extLst>
+            <a:ext uri="{909E8E84-426E-40DD-AFC4-6F175D3DCCD1}">
+              <a14:hiddenFill xmlns:a14="http://schemas.microsoft.com/office/drawing/2010/main">
+                <a:solidFill>
+                  <a:srgbClr val="FFFFFF"/>
+                </a:solidFill>
+              </a14:hiddenFill>
+            </a:ext>
+          </a:extLst>
+        </p:spPr>
+      </p:pic>
+      <p:sp>
+        <p:nvSpPr>
+          <p:cNvPr id="3" name="ZoneTexte 2">
+            <a:extLst>
+              <a:ext uri="{FF2B5EF4-FFF2-40B4-BE49-F238E27FC236}">
+                <a16:creationId xmlns:a16="http://schemas.microsoft.com/office/drawing/2014/main" id="{1582123C-25BF-42F1-97F8-35FFB48DFFAA}"/>
+              </a:ext>
+            </a:extLst>
+          </p:cNvPr>
+          <p:cNvSpPr txBox="1"/>
+          <p:nvPr/>
+        </p:nvSpPr>
+        <p:spPr>
+          <a:xfrm>
+            <a:off x="2477079" y="168260"/>
+            <a:ext cx="6848856" cy="584775"/>
+          </a:xfrm>
+          <a:prstGeom prst="rect">
+            <a:avLst/>
+          </a:prstGeom>
+          <a:noFill/>
+          <a:ln>
+            <a:noFill/>
+          </a:ln>
+          <a:effectLst>
+            <a:glow rad="63500">
+              <a:schemeClr val="accent4">
+                <a:satMod val="175000"/>
+                <a:alpha val="40000"/>
+              </a:schemeClr>
+            </a:glow>
+            <a:outerShdw blurRad="50800" dist="38100" dir="5400000" algn="t" rotWithShape="0">
+              <a:prstClr val="black">
+                <a:alpha val="40000"/>
+              </a:prstClr>
+            </a:outerShdw>
+          </a:effectLst>
+          <a:scene3d>
+            <a:camera prst="orthographicFront">
+              <a:rot lat="0" lon="0" rev="0"/>
+            </a:camera>
+            <a:lightRig rig="soft" dir="t">
+              <a:rot lat="0" lon="0" rev="0"/>
+            </a:lightRig>
+          </a:scene3d>
+          <a:sp3d contourW="44450" prstMaterial="matte">
+            <a:bevelT w="63500" h="63500" prst="artDeco"/>
+            <a:contourClr>
+              <a:srgbClr val="FFFFFF"/>
+            </a:contourClr>
+          </a:sp3d>
+        </p:spPr>
+        <p:txBody>
+          <a:bodyPr wrap="square" rtlCol="0">
+            <a:spAutoFit/>
+          </a:bodyPr>
+          <a:lstStyle/>
+          <a:p>
+            <a:pPr algn="ctr"/>
+            <a:r>
+              <a:rPr lang="fr-FR" sz="3200" b="1" dirty="0">
+                <a:latin typeface="Eras Medium ITC" panose="020B0602030504020804" pitchFamily="34" charset="0"/>
+              </a:rPr>
+              <a:t>Planification Gantt - </a:t>
+            </a:r>
+            <a:r>
+              <a:rPr lang="fr-FR" sz="2800" b="1" dirty="0">
+                <a:solidFill>
+                  <a:srgbClr val="A41258"/>
+                </a:solidFill>
+                <a:latin typeface="Eras Medium ITC" panose="020B0602030504020804" pitchFamily="34" charset="0"/>
+              </a:rPr>
+              <a:t>Partie personnelle </a:t>
+            </a:r>
+            <a:r>
+              <a:rPr lang="fr-FR" sz="2800" b="1" dirty="0">
+                <a:latin typeface="Eras Medium ITC" panose="020B0602030504020804" pitchFamily="34" charset="0"/>
+              </a:rPr>
+              <a:t>:</a:t>
+            </a:r>
+          </a:p>
+        </p:txBody>
+      </p:sp>
+      <p:pic>
+        <p:nvPicPr>
+          <p:cNvPr id="5" name="Image 4" descr="Une image contenant grand, garé&#10;&#10;Description générée automatiquement">
+            <a:extLst>
+              <a:ext uri="{FF2B5EF4-FFF2-40B4-BE49-F238E27FC236}">
+                <a16:creationId xmlns:a16="http://schemas.microsoft.com/office/drawing/2014/main" id="{45FACC8A-CDD4-4C6C-963F-87F803BF7A76}"/>
+              </a:ext>
+            </a:extLst>
+          </p:cNvPr>
+          <p:cNvPicPr>
+            <a:picLocks noChangeAspect="1"/>
+          </p:cNvPicPr>
+          <p:nvPr/>
+        </p:nvPicPr>
+        <p:blipFill>
+          <a:blip r:embed="rId3"/>
+          <a:stretch>
+            <a:fillRect/>
+          </a:stretch>
+        </p:blipFill>
+        <p:spPr>
+          <a:xfrm>
+            <a:off x="416430" y="913408"/>
+            <a:ext cx="8485929" cy="5776332"/>
+          </a:xfrm>
+          <a:prstGeom prst="rect">
+            <a:avLst/>
+          </a:prstGeom>
+        </p:spPr>
+      </p:pic>
+    </p:spTree>
+    <p:extLst>
+      <p:ext uri="{BB962C8B-B14F-4D97-AF65-F5344CB8AC3E}">
+        <p14:creationId xmlns:p14="http://schemas.microsoft.com/office/powerpoint/2010/main" val="1042172690"/>
+      </p:ext>
+    </p:extLst>
+  </p:cSld>
+  <p:clrMapOvr>
+    <a:masterClrMapping/>
+  </p:clrMapOvr>
+  <mc:AlternateContent xmlns:mc="http://schemas.openxmlformats.org/markup-compatibility/2006" xmlns:p159="http://schemas.microsoft.com/office/powerpoint/2015/09/main">
+    <mc:Choice Requires="p159">
+      <p:transition xmlns:p14="http://schemas.microsoft.com/office/powerpoint/2010/main" spd="slow" p14:dur="2000">
+        <p159:morph option="byObject"/>
+      </p:transition>
+    </mc:Choice>
+    <mc:Fallback xmlns="">
+      <p:transition spd="slow">
+        <p:fade/>
+      </p:transition>
+    </mc:Fallback>
+  </mc:AlternateContent>
+</p:sld>
+</file>
+
 <file path=ppt/slides/slide2.xml><?xml version="1.0" encoding="utf-8"?>
 <p:sld xmlns:a="http://schemas.openxmlformats.org/drawingml/2006/main" xmlns:r="http://schemas.openxmlformats.org/officeDocument/2006/relationships" xmlns:p="http://schemas.openxmlformats.org/presentationml/2006/main">
   <p:cSld>

</xml_diff>